<commit_message>
updated call to action
Several learning labs merged into one.
</commit_message>
<xml_diff>
--- a/1-Monday/Intro-to-Git/WASTC2024-vFDW-Intro-to-Git.pptx
+++ b/1-Monday/Intro-to-Git/WASTC2024-vFDW-Intro-to-Git.pptx
@@ -5,10 +5,10 @@
     <p:sldMasterId id="2147483648" r:id="rId1"/>
   </p:sldMasterIdLst>
   <p:notesMasterIdLst>
-    <p:notesMasterId r:id="rId32"/>
+    <p:notesMasterId r:id="rId21"/>
   </p:notesMasterIdLst>
   <p:handoutMasterIdLst>
-    <p:handoutMasterId r:id="rId33"/>
+    <p:handoutMasterId r:id="rId22"/>
   </p:handoutMasterIdLst>
   <p:sldIdLst>
     <p:sldId id="256" r:id="rId2"/>
@@ -30,17 +30,6 @@
     <p:sldId id="286" r:id="rId18"/>
     <p:sldId id="287" r:id="rId19"/>
     <p:sldId id="270" r:id="rId20"/>
-    <p:sldId id="260" r:id="rId21"/>
-    <p:sldId id="272" r:id="rId22"/>
-    <p:sldId id="273" r:id="rId23"/>
-    <p:sldId id="264" r:id="rId24"/>
-    <p:sldId id="265" r:id="rId25"/>
-    <p:sldId id="274" r:id="rId26"/>
-    <p:sldId id="266" r:id="rId27"/>
-    <p:sldId id="267" r:id="rId28"/>
-    <p:sldId id="275" r:id="rId29"/>
-    <p:sldId id="268" r:id="rId30"/>
-    <p:sldId id="269" r:id="rId31"/>
   </p:sldIdLst>
   <p:sldSz cx="12192000" cy="6858000"/>
   <p:notesSz cx="6858000" cy="9144000"/>
@@ -1015,342 +1004,6 @@
     <p:extLst>
       <p:ext uri="{BB962C8B-B14F-4D97-AF65-F5344CB8AC3E}">
         <p14:creationId xmlns:p14="http://schemas.microsoft.com/office/powerpoint/2010/main" val="3497501522"/>
-      </p:ext>
-    </p:extLst>
-  </p:cSld>
-  <p:clrMapOvr>
-    <a:masterClrMapping/>
-  </p:clrMapOvr>
-</p:notes>
-</file>
-
-<file path=ppt/notesSlides/notesSlide5.xml><?xml version="1.0" encoding="utf-8"?>
-<p:notes xmlns:a="http://schemas.openxmlformats.org/drawingml/2006/main" xmlns:r="http://schemas.openxmlformats.org/officeDocument/2006/relationships" xmlns:p="http://schemas.openxmlformats.org/presentationml/2006/main">
-  <p:cSld>
-    <p:spTree>
-      <p:nvGrpSpPr>
-        <p:cNvPr id="1" name=""/>
-        <p:cNvGrpSpPr/>
-        <p:nvPr/>
-      </p:nvGrpSpPr>
-      <p:grpSpPr>
-        <a:xfrm>
-          <a:off x="0" y="0"/>
-          <a:ext cx="0" cy="0"/>
-          <a:chOff x="0" y="0"/>
-          <a:chExt cx="0" cy="0"/>
-        </a:xfrm>
-      </p:grpSpPr>
-      <p:sp>
-        <p:nvSpPr>
-          <p:cNvPr id="2" name="Slide Image Placeholder 1"/>
-          <p:cNvSpPr>
-            <a:spLocks noGrp="1" noRot="1" noChangeAspect="1"/>
-          </p:cNvSpPr>
-          <p:nvPr>
-            <p:ph type="sldImg"/>
-          </p:nvPr>
-        </p:nvSpPr>
-        <p:spPr/>
-      </p:sp>
-      <p:sp>
-        <p:nvSpPr>
-          <p:cNvPr id="3" name="Notes Placeholder 2"/>
-          <p:cNvSpPr>
-            <a:spLocks noGrp="1"/>
-          </p:cNvSpPr>
-          <p:nvPr>
-            <p:ph type="body" idx="1"/>
-          </p:nvPr>
-        </p:nvSpPr>
-        <p:spPr/>
-        <p:txBody>
-          <a:bodyPr/>
-          <a:lstStyle/>
-          <a:p>
-            <a:endParaRPr lang="en-US" dirty="0"/>
-          </a:p>
-        </p:txBody>
-      </p:sp>
-      <p:sp>
-        <p:nvSpPr>
-          <p:cNvPr id="4" name="Slide Number Placeholder 3"/>
-          <p:cNvSpPr>
-            <a:spLocks noGrp="1"/>
-          </p:cNvSpPr>
-          <p:nvPr>
-            <p:ph type="sldNum" sz="quarter" idx="5"/>
-          </p:nvPr>
-        </p:nvSpPr>
-        <p:spPr/>
-        <p:txBody>
-          <a:bodyPr/>
-          <a:lstStyle/>
-          <a:p>
-            <a:fld id="{A6590377-9AB7-BE4E-B5A4-7BC5E2C22E46}" type="slidenum">
-              <a:rPr lang="en-US" smtClean="0"/>
-              <a:t>21</a:t>
-            </a:fld>
-            <a:endParaRPr lang="en-US"/>
-          </a:p>
-        </p:txBody>
-      </p:sp>
-    </p:spTree>
-    <p:extLst>
-      <p:ext uri="{BB962C8B-B14F-4D97-AF65-F5344CB8AC3E}">
-        <p14:creationId xmlns:p14="http://schemas.microsoft.com/office/powerpoint/2010/main" val="1065210726"/>
-      </p:ext>
-    </p:extLst>
-  </p:cSld>
-  <p:clrMapOvr>
-    <a:masterClrMapping/>
-  </p:clrMapOvr>
-</p:notes>
-</file>
-
-<file path=ppt/notesSlides/notesSlide6.xml><?xml version="1.0" encoding="utf-8"?>
-<p:notes xmlns:a="http://schemas.openxmlformats.org/drawingml/2006/main" xmlns:r="http://schemas.openxmlformats.org/officeDocument/2006/relationships" xmlns:p="http://schemas.openxmlformats.org/presentationml/2006/main">
-  <p:cSld>
-    <p:spTree>
-      <p:nvGrpSpPr>
-        <p:cNvPr id="1" name=""/>
-        <p:cNvGrpSpPr/>
-        <p:nvPr/>
-      </p:nvGrpSpPr>
-      <p:grpSpPr>
-        <a:xfrm>
-          <a:off x="0" y="0"/>
-          <a:ext cx="0" cy="0"/>
-          <a:chOff x="0" y="0"/>
-          <a:chExt cx="0" cy="0"/>
-        </a:xfrm>
-      </p:grpSpPr>
-      <p:sp>
-        <p:nvSpPr>
-          <p:cNvPr id="2" name="Slide Image Placeholder 1"/>
-          <p:cNvSpPr>
-            <a:spLocks noGrp="1" noRot="1" noChangeAspect="1"/>
-          </p:cNvSpPr>
-          <p:nvPr>
-            <p:ph type="sldImg"/>
-          </p:nvPr>
-        </p:nvSpPr>
-        <p:spPr/>
-      </p:sp>
-      <p:sp>
-        <p:nvSpPr>
-          <p:cNvPr id="3" name="Notes Placeholder 2"/>
-          <p:cNvSpPr>
-            <a:spLocks noGrp="1"/>
-          </p:cNvSpPr>
-          <p:nvPr>
-            <p:ph type="body" idx="1"/>
-          </p:nvPr>
-        </p:nvSpPr>
-        <p:spPr/>
-        <p:txBody>
-          <a:bodyPr/>
-          <a:lstStyle/>
-          <a:p>
-            <a:endParaRPr lang="en-US" dirty="0"/>
-          </a:p>
-        </p:txBody>
-      </p:sp>
-      <p:sp>
-        <p:nvSpPr>
-          <p:cNvPr id="4" name="Slide Number Placeholder 3"/>
-          <p:cNvSpPr>
-            <a:spLocks noGrp="1"/>
-          </p:cNvSpPr>
-          <p:nvPr>
-            <p:ph type="sldNum" sz="quarter" idx="5"/>
-          </p:nvPr>
-        </p:nvSpPr>
-        <p:spPr/>
-        <p:txBody>
-          <a:bodyPr/>
-          <a:lstStyle/>
-          <a:p>
-            <a:fld id="{A6590377-9AB7-BE4E-B5A4-7BC5E2C22E46}" type="slidenum">
-              <a:rPr lang="en-US" smtClean="0"/>
-              <a:t>22</a:t>
-            </a:fld>
-            <a:endParaRPr lang="en-US"/>
-          </a:p>
-        </p:txBody>
-      </p:sp>
-    </p:spTree>
-    <p:extLst>
-      <p:ext uri="{BB962C8B-B14F-4D97-AF65-F5344CB8AC3E}">
-        <p14:creationId xmlns:p14="http://schemas.microsoft.com/office/powerpoint/2010/main" val="737303357"/>
-      </p:ext>
-    </p:extLst>
-  </p:cSld>
-  <p:clrMapOvr>
-    <a:masterClrMapping/>
-  </p:clrMapOvr>
-</p:notes>
-</file>
-
-<file path=ppt/notesSlides/notesSlide7.xml><?xml version="1.0" encoding="utf-8"?>
-<p:notes xmlns:a="http://schemas.openxmlformats.org/drawingml/2006/main" xmlns:r="http://schemas.openxmlformats.org/officeDocument/2006/relationships" xmlns:p="http://schemas.openxmlformats.org/presentationml/2006/main">
-  <p:cSld>
-    <p:spTree>
-      <p:nvGrpSpPr>
-        <p:cNvPr id="1" name=""/>
-        <p:cNvGrpSpPr/>
-        <p:nvPr/>
-      </p:nvGrpSpPr>
-      <p:grpSpPr>
-        <a:xfrm>
-          <a:off x="0" y="0"/>
-          <a:ext cx="0" cy="0"/>
-          <a:chOff x="0" y="0"/>
-          <a:chExt cx="0" cy="0"/>
-        </a:xfrm>
-      </p:grpSpPr>
-      <p:sp>
-        <p:nvSpPr>
-          <p:cNvPr id="2" name="Slide Image Placeholder 1"/>
-          <p:cNvSpPr>
-            <a:spLocks noGrp="1" noRot="1" noChangeAspect="1"/>
-          </p:cNvSpPr>
-          <p:nvPr>
-            <p:ph type="sldImg"/>
-          </p:nvPr>
-        </p:nvSpPr>
-        <p:spPr/>
-      </p:sp>
-      <p:sp>
-        <p:nvSpPr>
-          <p:cNvPr id="3" name="Notes Placeholder 2"/>
-          <p:cNvSpPr>
-            <a:spLocks noGrp="1"/>
-          </p:cNvSpPr>
-          <p:nvPr>
-            <p:ph type="body" idx="1"/>
-          </p:nvPr>
-        </p:nvSpPr>
-        <p:spPr/>
-        <p:txBody>
-          <a:bodyPr/>
-          <a:lstStyle/>
-          <a:p>
-            <a:endParaRPr lang="en-US" dirty="0"/>
-          </a:p>
-        </p:txBody>
-      </p:sp>
-      <p:sp>
-        <p:nvSpPr>
-          <p:cNvPr id="4" name="Slide Number Placeholder 3"/>
-          <p:cNvSpPr>
-            <a:spLocks noGrp="1"/>
-          </p:cNvSpPr>
-          <p:nvPr>
-            <p:ph type="sldNum" sz="quarter" idx="5"/>
-          </p:nvPr>
-        </p:nvSpPr>
-        <p:spPr/>
-        <p:txBody>
-          <a:bodyPr/>
-          <a:lstStyle/>
-          <a:p>
-            <a:fld id="{A6590377-9AB7-BE4E-B5A4-7BC5E2C22E46}" type="slidenum">
-              <a:rPr lang="en-US" smtClean="0"/>
-              <a:t>25</a:t>
-            </a:fld>
-            <a:endParaRPr lang="en-US"/>
-          </a:p>
-        </p:txBody>
-      </p:sp>
-    </p:spTree>
-    <p:extLst>
-      <p:ext uri="{BB962C8B-B14F-4D97-AF65-F5344CB8AC3E}">
-        <p14:creationId xmlns:p14="http://schemas.microsoft.com/office/powerpoint/2010/main" val="2394685018"/>
-      </p:ext>
-    </p:extLst>
-  </p:cSld>
-  <p:clrMapOvr>
-    <a:masterClrMapping/>
-  </p:clrMapOvr>
-</p:notes>
-</file>
-
-<file path=ppt/notesSlides/notesSlide8.xml><?xml version="1.0" encoding="utf-8"?>
-<p:notes xmlns:a="http://schemas.openxmlformats.org/drawingml/2006/main" xmlns:r="http://schemas.openxmlformats.org/officeDocument/2006/relationships" xmlns:p="http://schemas.openxmlformats.org/presentationml/2006/main">
-  <p:cSld>
-    <p:spTree>
-      <p:nvGrpSpPr>
-        <p:cNvPr id="1" name=""/>
-        <p:cNvGrpSpPr/>
-        <p:nvPr/>
-      </p:nvGrpSpPr>
-      <p:grpSpPr>
-        <a:xfrm>
-          <a:off x="0" y="0"/>
-          <a:ext cx="0" cy="0"/>
-          <a:chOff x="0" y="0"/>
-          <a:chExt cx="0" cy="0"/>
-        </a:xfrm>
-      </p:grpSpPr>
-      <p:sp>
-        <p:nvSpPr>
-          <p:cNvPr id="2" name="Slide Image Placeholder 1"/>
-          <p:cNvSpPr>
-            <a:spLocks noGrp="1" noRot="1" noChangeAspect="1"/>
-          </p:cNvSpPr>
-          <p:nvPr>
-            <p:ph type="sldImg"/>
-          </p:nvPr>
-        </p:nvSpPr>
-        <p:spPr/>
-      </p:sp>
-      <p:sp>
-        <p:nvSpPr>
-          <p:cNvPr id="3" name="Notes Placeholder 2"/>
-          <p:cNvSpPr>
-            <a:spLocks noGrp="1"/>
-          </p:cNvSpPr>
-          <p:nvPr>
-            <p:ph type="body" idx="1"/>
-          </p:nvPr>
-        </p:nvSpPr>
-        <p:spPr/>
-        <p:txBody>
-          <a:bodyPr/>
-          <a:lstStyle/>
-          <a:p>
-            <a:endParaRPr lang="en-US" dirty="0"/>
-          </a:p>
-        </p:txBody>
-      </p:sp>
-      <p:sp>
-        <p:nvSpPr>
-          <p:cNvPr id="4" name="Slide Number Placeholder 3"/>
-          <p:cNvSpPr>
-            <a:spLocks noGrp="1"/>
-          </p:cNvSpPr>
-          <p:nvPr>
-            <p:ph type="sldNum" sz="quarter" idx="5"/>
-          </p:nvPr>
-        </p:nvSpPr>
-        <p:spPr/>
-        <p:txBody>
-          <a:bodyPr/>
-          <a:lstStyle/>
-          <a:p>
-            <a:fld id="{A6590377-9AB7-BE4E-B5A4-7BC5E2C22E46}" type="slidenum">
-              <a:rPr lang="en-US" smtClean="0"/>
-              <a:t>28</a:t>
-            </a:fld>
-            <a:endParaRPr lang="en-US"/>
-          </a:p>
-        </p:txBody>
-      </p:sp>
-    </p:spTree>
-    <p:extLst>
-      <p:ext uri="{BB962C8B-B14F-4D97-AF65-F5344CB8AC3E}">
-        <p14:creationId xmlns:p14="http://schemas.microsoft.com/office/powerpoint/2010/main" val="2563840373"/>
       </p:ext>
     </p:extLst>
   </p:cSld>
@@ -8578,7 +8231,7 @@
         </p:nvSpPr>
         <p:spPr>
           <a:xfrm>
-            <a:off x="1633262" y="345662"/>
+            <a:off x="1967484" y="618931"/>
             <a:ext cx="8257032" cy="731520"/>
           </a:xfrm>
         </p:spPr>
@@ -8623,7 +8276,7 @@
         </p:nvSpPr>
         <p:spPr>
           <a:xfrm>
-            <a:off x="9692196" y="5311816"/>
+            <a:off x="10026418" y="5585085"/>
             <a:ext cx="359666" cy="274637"/>
           </a:xfrm>
           <a:prstGeom prst="rect">
@@ -8734,10 +8387,10 @@
       </p:sp>
       <p:sp>
         <p:nvSpPr>
-          <p:cNvPr id="7" name="Text Placeholder 1">
+          <p:cNvPr id="10" name="Text Placeholder 3">
             <a:extLst>
               <a:ext uri="{FF2B5EF4-FFF2-40B4-BE49-F238E27FC236}">
-                <a16:creationId xmlns:a16="http://schemas.microsoft.com/office/drawing/2014/main" id="{37227558-25DF-1BDD-0DCF-9125A6CA5C53}"/>
+                <a16:creationId xmlns:a16="http://schemas.microsoft.com/office/drawing/2014/main" id="{533AE5FE-35A8-01BC-C529-B8C0524B411A}"/>
               </a:ext>
             </a:extLst>
           </p:cNvPr>
@@ -8748,8 +8401,8 @@
         </p:nvSpPr>
         <p:spPr>
           <a:xfrm>
-            <a:off x="1633262" y="2749901"/>
-            <a:ext cx="2769222" cy="3219450"/>
+            <a:off x="2537371" y="3019619"/>
+            <a:ext cx="7061350" cy="3219450"/>
           </a:xfrm>
           <a:prstGeom prst="rect">
             <a:avLst/>
@@ -8937,12 +8590,8 @@
               <a:buNone/>
             </a:pPr>
             <a:r>
-              <a:rPr lang="en-US" sz="2000" dirty="0">
-                <a:solidFill>
-                  <a:schemeClr val="accent5"/>
-                </a:solidFill>
-              </a:rPr>
-              <a:t>Introduction to Version Control Systems</a:t>
+              <a:rPr lang="en-US" sz="2000" dirty="0"/>
+              <a:t>Git Branching</a:t>
             </a:r>
           </a:p>
           <a:p>
@@ -8950,26 +8599,41 @@
               <a:buFont typeface="Arial" charset="0"/>
               <a:buNone/>
             </a:pPr>
-            <a:br>
+            <a:endParaRPr lang="en-US" sz="2000" dirty="0"/>
+          </a:p>
+          <a:p>
+            <a:pPr marL="0" indent="0" algn="ctr">
+              <a:buFont typeface="Arial" charset="0"/>
+              <a:buNone/>
+            </a:pPr>
+            <a:r>
               <a:rPr lang="en-US" sz="2000" dirty="0"/>
-            </a:br>
-            <a:r>
-              <a:rPr lang="en-US" sz="2000" dirty="0">
-                <a:solidFill>
-                  <a:schemeClr val="accent5"/>
-                </a:solidFill>
-              </a:rPr>
-              <a:t>Learn how to use Git for version control including configuration, commits, and differences.</a:t>
-            </a:r>
-          </a:p>
-        </p:txBody>
-      </p:sp>
-      <p:sp>
-        <p:nvSpPr>
-          <p:cNvPr id="8" name="Circle">
+              <a:t>Learn the basics of Git branching so that you can diverge from the main code base.</a:t>
+            </a:r>
+          </a:p>
+          <a:p>
+            <a:pPr marL="0" indent="0" algn="ctr">
+              <a:buFont typeface="Arial" charset="0"/>
+              <a:buNone/>
+            </a:pPr>
+            <a:r>
+              <a:rPr lang="en-US" sz="2670" dirty="0"/>
+              <a:t>https://</a:t>
+            </a:r>
+            <a:r>
+              <a:rPr lang="en-US" sz="2670" dirty="0" err="1"/>
+              <a:t>learngitbranching.js.org</a:t>
+            </a:r>
+            <a:endParaRPr lang="en-US" sz="2670" dirty="0"/>
+          </a:p>
+        </p:txBody>
+      </p:sp>
+      <p:sp>
+        <p:nvSpPr>
+          <p:cNvPr id="11" name="Circle">
             <a:extLst>
               <a:ext uri="{FF2B5EF4-FFF2-40B4-BE49-F238E27FC236}">
-                <a16:creationId xmlns:a16="http://schemas.microsoft.com/office/drawing/2014/main" id="{3F78A245-7119-464E-6F31-91068C96E1AF}"/>
+                <a16:creationId xmlns:a16="http://schemas.microsoft.com/office/drawing/2014/main" id="{EFA697D4-B39F-2CF7-8223-4E92D77AC977}"/>
               </a:ext>
             </a:extLst>
           </p:cNvPr>
@@ -8978,14 +8642,14 @@
         </p:nvSpPr>
         <p:spPr>
           <a:xfrm>
-            <a:off x="2588538" y="1807729"/>
-            <a:ext cx="858673" cy="858897"/>
+            <a:off x="5641951" y="1965384"/>
+            <a:ext cx="855375" cy="855597"/>
           </a:xfrm>
           <a:prstGeom prst="ellipse">
             <a:avLst/>
           </a:prstGeom>
           <a:solidFill>
-            <a:srgbClr val="0076D5"/>
+            <a:srgbClr val="74BF4B"/>
           </a:solidFill>
           <a:ln w="12700">
             <a:miter lim="400000"/>
@@ -9012,10 +8676,10 @@
       </p:sp>
       <p:sp>
         <p:nvSpPr>
-          <p:cNvPr id="9" name="1">
+          <p:cNvPr id="12" name="2">
             <a:extLst>
               <a:ext uri="{FF2B5EF4-FFF2-40B4-BE49-F238E27FC236}">
-                <a16:creationId xmlns:a16="http://schemas.microsoft.com/office/drawing/2014/main" id="{7306C8EF-E6CA-5ACB-1C8B-C93235425DBB}"/>
+                <a16:creationId xmlns:a16="http://schemas.microsoft.com/office/drawing/2014/main" id="{4E09075F-3C40-3BAC-EFCB-A8AEDADAE657}"/>
               </a:ext>
             </a:extLst>
           </p:cNvPr>
@@ -9024,7 +8688,7 @@
         </p:nvSpPr>
         <p:spPr>
           <a:xfrm>
-            <a:off x="2775660" y="1827773"/>
+            <a:off x="5825833" y="1955566"/>
             <a:ext cx="484427" cy="692345"/>
           </a:xfrm>
           <a:prstGeom prst="rect">
@@ -9062,7 +8726,7 @@
           </a:lstStyle>
           <a:p>
             <a:r>
-              <a:rPr sz="3899" dirty="0">
+              <a:rPr lang="en-US" sz="3899" dirty="0">
                 <a:solidFill>
                   <a:schemeClr val="bg1"/>
                 </a:solidFill>
@@ -9070,693 +8734,12 @@
               </a:rPr>
               <a:t>1</a:t>
             </a:r>
-          </a:p>
-        </p:txBody>
-      </p:sp>
-      <p:sp>
-        <p:nvSpPr>
-          <p:cNvPr id="10" name="Text Placeholder 3">
-            <a:extLst>
-              <a:ext uri="{FF2B5EF4-FFF2-40B4-BE49-F238E27FC236}">
-                <a16:creationId xmlns:a16="http://schemas.microsoft.com/office/drawing/2014/main" id="{533AE5FE-35A8-01BC-C529-B8C0524B411A}"/>
-              </a:ext>
-            </a:extLst>
-          </p:cNvPr>
-          <p:cNvSpPr txBox="1">
-            <a:spLocks/>
-          </p:cNvSpPr>
-          <p:nvPr/>
-        </p:nvSpPr>
-        <p:spPr>
-          <a:xfrm>
-            <a:off x="4387305" y="2749901"/>
-            <a:ext cx="2696519" cy="3219450"/>
-          </a:xfrm>
-          <a:prstGeom prst="rect">
-            <a:avLst/>
-          </a:prstGeom>
-        </p:spPr>
-        <p:txBody>
-          <a:bodyPr/>
-          <a:lstStyle>
-            <a:lvl1pPr marL="169863" indent="-169863" algn="l" defTabSz="684213" rtl="0" eaLnBrk="1" fontAlgn="base" hangingPunct="1">
-              <a:lnSpc>
-                <a:spcPct val="95000"/>
-              </a:lnSpc>
-              <a:spcBef>
-                <a:spcPts val="1075"/>
-              </a:spcBef>
-              <a:spcAft>
-                <a:spcPct val="0"/>
-              </a:spcAft>
-              <a:buClr>
-                <a:schemeClr val="tx2"/>
-              </a:buClr>
-              <a:buSzPct val="90000"/>
-              <a:buFont typeface="Arial" charset="0"/>
-              <a:buChar char="•"/>
-              <a:defRPr lang="en-US" sz="1500" kern="1200" dirty="0">
-                <a:solidFill>
-                  <a:schemeClr val="tx1"/>
-                </a:solidFill>
-                <a:latin typeface="+mn-lt"/>
-                <a:ea typeface="ＭＳ Ｐゴシック" charset="0"/>
-                <a:cs typeface="CiscoSans"/>
-              </a:defRPr>
-            </a:lvl1pPr>
-            <a:lvl2pPr marL="358775" indent="-215900" algn="l" defTabSz="684213" rtl="0" eaLnBrk="1" fontAlgn="base" hangingPunct="1">
-              <a:lnSpc>
-                <a:spcPct val="95000"/>
-              </a:lnSpc>
-              <a:spcBef>
-                <a:spcPts val="600"/>
-              </a:spcBef>
-              <a:spcAft>
-                <a:spcPct val="0"/>
-              </a:spcAft>
-              <a:buClr>
-                <a:schemeClr val="tx2"/>
-              </a:buClr>
-              <a:buFont typeface="Arial" charset="0"/>
-              <a:buChar char="•"/>
-              <a:defRPr lang="en-US" sz="1400" kern="1200" dirty="0">
-                <a:solidFill>
-                  <a:schemeClr val="tx1"/>
-                </a:solidFill>
-                <a:latin typeface="+mn-lt"/>
-                <a:ea typeface="ＭＳ Ｐゴシック" charset="0"/>
-                <a:cs typeface="CiscoSans"/>
-              </a:defRPr>
-            </a:lvl2pPr>
-            <a:lvl3pPr marL="431800" indent="-169863" algn="l" defTabSz="684213" rtl="0" eaLnBrk="1" fontAlgn="base" hangingPunct="1">
-              <a:lnSpc>
-                <a:spcPct val="95000"/>
-              </a:lnSpc>
-              <a:spcBef>
-                <a:spcPts val="625"/>
-              </a:spcBef>
-              <a:spcAft>
-                <a:spcPct val="0"/>
-              </a:spcAft>
-              <a:buFont typeface="Arial" charset="0"/>
-              <a:buChar char="•"/>
-              <a:defRPr lang="en-US" sz="1200" kern="1200" dirty="0">
-                <a:solidFill>
-                  <a:schemeClr val="tx1"/>
-                </a:solidFill>
-                <a:latin typeface="+mn-lt"/>
-                <a:ea typeface="ＭＳ Ｐゴシック" charset="0"/>
-                <a:cs typeface="CiscoSans"/>
-              </a:defRPr>
-            </a:lvl3pPr>
-            <a:lvl4pPr marL="503238" indent="-169863" algn="l" defTabSz="684213" rtl="0" eaLnBrk="1" fontAlgn="base" hangingPunct="1">
-              <a:lnSpc>
-                <a:spcPct val="95000"/>
-              </a:lnSpc>
-              <a:spcBef>
-                <a:spcPts val="625"/>
-              </a:spcBef>
-              <a:spcAft>
-                <a:spcPct val="0"/>
-              </a:spcAft>
-              <a:buFont typeface="Arial" charset="0"/>
-              <a:buChar char="•"/>
-              <a:defRPr lang="en-US" sz="1100" kern="1200" dirty="0">
-                <a:solidFill>
-                  <a:schemeClr val="tx1"/>
-                </a:solidFill>
-                <a:latin typeface="+mn-lt"/>
-                <a:ea typeface="ＭＳ Ｐゴシック" charset="0"/>
-                <a:cs typeface="CiscoSans"/>
-              </a:defRPr>
-            </a:lvl4pPr>
-            <a:lvl5pPr marL="574675" indent="-169863" algn="l" defTabSz="684213" rtl="0" eaLnBrk="1" fontAlgn="base" hangingPunct="1">
-              <a:lnSpc>
-                <a:spcPct val="95000"/>
-              </a:lnSpc>
-              <a:spcBef>
-                <a:spcPts val="625"/>
-              </a:spcBef>
-              <a:spcAft>
-                <a:spcPct val="0"/>
-              </a:spcAft>
-              <a:buFont typeface="Arial" charset="0"/>
-              <a:buChar char="•"/>
-              <a:defRPr lang="en-US" sz="1100" kern="1200" dirty="0">
-                <a:solidFill>
-                  <a:schemeClr val="tx1"/>
-                </a:solidFill>
-                <a:latin typeface="+mn-lt"/>
-                <a:ea typeface="ＭＳ Ｐゴシック" charset="0"/>
-                <a:cs typeface="CiscoSans"/>
-              </a:defRPr>
-            </a:lvl5pPr>
-            <a:lvl6pPr marL="863856" indent="-171445" algn="l" defTabSz="685777" rtl="0" eaLnBrk="1" latinLnBrk="0" hangingPunct="1">
-              <a:spcBef>
-                <a:spcPts val="600"/>
-              </a:spcBef>
-              <a:buFont typeface="Arial" pitchFamily="34" charset="0"/>
-              <a:buChar char="•"/>
-              <a:defRPr sz="900" kern="1200" baseline="0">
-                <a:solidFill>
-                  <a:schemeClr val="tx1"/>
-                </a:solidFill>
-                <a:latin typeface="+mn-lt"/>
-                <a:ea typeface="+mn-ea"/>
-                <a:cs typeface="+mn-cs"/>
-              </a:defRPr>
-            </a:lvl6pPr>
-            <a:lvl7pPr marL="935844" indent="-171422" algn="l" defTabSz="685777" rtl="0" eaLnBrk="1" latinLnBrk="0" hangingPunct="1">
-              <a:spcBef>
-                <a:spcPts val="600"/>
-              </a:spcBef>
-              <a:buFont typeface="Arial" pitchFamily="34" charset="0"/>
-              <a:buChar char="•"/>
-              <a:defRPr sz="800" kern="1200" baseline="0">
-                <a:solidFill>
-                  <a:schemeClr val="tx1"/>
-                </a:solidFill>
-                <a:latin typeface="+mn-lt"/>
-                <a:ea typeface="+mn-ea"/>
-                <a:cs typeface="+mn-cs"/>
-              </a:defRPr>
-            </a:lvl7pPr>
-            <a:lvl8pPr marL="2400220" indent="0" algn="l" defTabSz="685777" rtl="0" eaLnBrk="1" latinLnBrk="0" hangingPunct="1">
-              <a:spcBef>
-                <a:spcPct val="20000"/>
-              </a:spcBef>
-              <a:buFont typeface="Arial" pitchFamily="34" charset="0"/>
-              <a:buNone/>
-              <a:defRPr sz="1500" kern="1200">
-                <a:solidFill>
-                  <a:schemeClr val="tx1"/>
-                </a:solidFill>
-                <a:latin typeface="+mn-lt"/>
-                <a:ea typeface="+mn-ea"/>
-                <a:cs typeface="+mn-cs"/>
-              </a:defRPr>
-            </a:lvl8pPr>
-            <a:lvl9pPr marL="2914553" indent="-171445" algn="l" defTabSz="685777" rtl="0" eaLnBrk="1" latinLnBrk="0" hangingPunct="1">
-              <a:spcBef>
-                <a:spcPct val="20000"/>
-              </a:spcBef>
-              <a:buFont typeface="Arial" pitchFamily="34" charset="0"/>
-              <a:buChar char="•"/>
-              <a:defRPr sz="1500" kern="1200">
-                <a:solidFill>
-                  <a:schemeClr val="tx1"/>
-                </a:solidFill>
-                <a:latin typeface="+mn-lt"/>
-                <a:ea typeface="+mn-ea"/>
-                <a:cs typeface="+mn-cs"/>
-              </a:defRPr>
-            </a:lvl9pPr>
-          </a:lstStyle>
-          <a:p>
-            <a:pPr marL="0" indent="0" algn="ctr">
-              <a:buFont typeface="Arial" charset="0"/>
-              <a:buNone/>
-            </a:pPr>
-            <a:r>
-              <a:rPr lang="en-US" sz="2000" dirty="0"/>
-              <a:t>Git Branching</a:t>
-            </a:r>
-          </a:p>
-          <a:p>
-            <a:pPr marL="0" indent="0" algn="ctr">
-              <a:buFont typeface="Arial" charset="0"/>
-              <a:buNone/>
-            </a:pPr>
-            <a:endParaRPr lang="en-US" sz="2000" dirty="0"/>
-          </a:p>
-          <a:p>
-            <a:pPr marL="0" indent="0" algn="ctr">
-              <a:buFont typeface="Arial" charset="0"/>
-              <a:buNone/>
-            </a:pPr>
-            <a:r>
-              <a:rPr lang="en-US" sz="2000" dirty="0"/>
-              <a:t>Learn the basics of Git branching so that you can diverge from the main code base.</a:t>
-            </a:r>
-            <a:endParaRPr lang="en-US" sz="2670" dirty="0"/>
-          </a:p>
-        </p:txBody>
-      </p:sp>
-      <p:sp>
-        <p:nvSpPr>
-          <p:cNvPr id="11" name="Circle">
-            <a:extLst>
-              <a:ext uri="{FF2B5EF4-FFF2-40B4-BE49-F238E27FC236}">
-                <a16:creationId xmlns:a16="http://schemas.microsoft.com/office/drawing/2014/main" id="{EFA697D4-B39F-2CF7-8223-4E92D77AC977}"/>
-              </a:ext>
-            </a:extLst>
-          </p:cNvPr>
-          <p:cNvSpPr/>
-          <p:nvPr/>
-        </p:nvSpPr>
-        <p:spPr>
-          <a:xfrm>
-            <a:off x="5340041" y="1807729"/>
-            <a:ext cx="855375" cy="855597"/>
-          </a:xfrm>
-          <a:prstGeom prst="ellipse">
-            <a:avLst/>
-          </a:prstGeom>
-          <a:solidFill>
-            <a:srgbClr val="74BF4B"/>
-          </a:solidFill>
-          <a:ln w="12700">
-            <a:miter lim="400000"/>
-          </a:ln>
-        </p:spPr>
-        <p:txBody>
-          <a:bodyPr tIns="45708" bIns="45708" anchor="ctr"/>
-          <a:lstStyle/>
-          <a:p>
-            <a:pPr defTabSz="911873">
-              <a:defRPr sz="5000">
-                <a:solidFill>
-                  <a:schemeClr val="accent3">
-                    <a:hueOff val="937500"/>
-                    <a:satOff val="68855"/>
-                    <a:lumOff val="-8431"/>
-                  </a:schemeClr>
-                </a:solidFill>
-              </a:defRPr>
-            </a:pPr>
-            <a:endParaRPr sz="2500" dirty="0"/>
-          </a:p>
-        </p:txBody>
-      </p:sp>
-      <p:sp>
-        <p:nvSpPr>
-          <p:cNvPr id="12" name="2">
-            <a:extLst>
-              <a:ext uri="{FF2B5EF4-FFF2-40B4-BE49-F238E27FC236}">
-                <a16:creationId xmlns:a16="http://schemas.microsoft.com/office/drawing/2014/main" id="{4E09075F-3C40-3BAC-EFCB-A8AEDADAE657}"/>
-              </a:ext>
-            </a:extLst>
-          </p:cNvPr>
-          <p:cNvSpPr txBox="1"/>
-          <p:nvPr/>
-        </p:nvSpPr>
-        <p:spPr>
-          <a:xfrm>
-            <a:off x="5523923" y="1797911"/>
-            <a:ext cx="484427" cy="692345"/>
-          </a:xfrm>
-          <a:prstGeom prst="rect">
-            <a:avLst/>
-          </a:prstGeom>
-          <a:ln w="25400">
-            <a:miter lim="400000"/>
-          </a:ln>
-          <a:extLst>
-            <a:ext uri="{C572A759-6A51-4108-AA02-DFA0A04FC94B}">
-              <ma14:wrappingTextBoxFlag xmlns="" xmlns:m="http://schemas.openxmlformats.org/officeDocument/2006/math" xmlns:a14="http://schemas.microsoft.com/office/drawing/2010/main" xmlns:ma14="http://schemas.microsoft.com/office/mac/drawingml/2011/main" val="1"/>
-            </a:ext>
-          </a:extLst>
-        </p:spPr>
-        <p:txBody>
-          <a:bodyPr wrap="square" tIns="45708" bIns="45708" anchor="ctr">
-            <a:spAutoFit/>
-          </a:bodyPr>
-          <a:lstStyle>
-            <a:lvl1pPr algn="ctr">
-              <a:defRPr sz="7800">
-                <a:solidFill>
-                  <a:schemeClr val="accent3">
-                    <a:hueOff val="937500"/>
-                    <a:satOff val="68855"/>
-                    <a:lumOff val="-8431"/>
-                  </a:schemeClr>
-                </a:solidFill>
-                <a:latin typeface="+mj-lt"/>
-                <a:ea typeface="+mj-ea"/>
-                <a:cs typeface="+mj-cs"/>
-                <a:sym typeface="CiscoSansTT Light"/>
-              </a:defRPr>
-            </a:lvl1pPr>
-          </a:lstStyle>
-          <a:p>
-            <a:r>
-              <a:rPr sz="3899" dirty="0">
-                <a:solidFill>
-                  <a:schemeClr val="bg1"/>
-                </a:solidFill>
-                <a:latin typeface="CiscoSansTT Light" panose="020B0503020201020303" pitchFamily="34" charset="0"/>
-              </a:rPr>
-              <a:t>2</a:t>
-            </a:r>
-          </a:p>
-        </p:txBody>
-      </p:sp>
-      <p:sp>
-        <p:nvSpPr>
-          <p:cNvPr id="13" name="Text Placeholder 4">
-            <a:extLst>
-              <a:ext uri="{FF2B5EF4-FFF2-40B4-BE49-F238E27FC236}">
-                <a16:creationId xmlns:a16="http://schemas.microsoft.com/office/drawing/2014/main" id="{7E505F23-A7A7-C280-B197-94B4B1C5390D}"/>
-              </a:ext>
-            </a:extLst>
-          </p:cNvPr>
-          <p:cNvSpPr txBox="1">
-            <a:spLocks/>
-          </p:cNvSpPr>
-          <p:nvPr/>
-        </p:nvSpPr>
-        <p:spPr>
-          <a:xfrm>
-            <a:off x="7156526" y="2749901"/>
-            <a:ext cx="2895335" cy="3219450"/>
-          </a:xfrm>
-          <a:prstGeom prst="rect">
-            <a:avLst/>
-          </a:prstGeom>
-        </p:spPr>
-        <p:txBody>
-          <a:bodyPr/>
-          <a:lstStyle>
-            <a:lvl1pPr marL="169863" indent="-169863" algn="l" defTabSz="684213" rtl="0" eaLnBrk="1" fontAlgn="base" hangingPunct="1">
-              <a:lnSpc>
-                <a:spcPct val="95000"/>
-              </a:lnSpc>
-              <a:spcBef>
-                <a:spcPts val="1075"/>
-              </a:spcBef>
-              <a:spcAft>
-                <a:spcPct val="0"/>
-              </a:spcAft>
-              <a:buClr>
-                <a:schemeClr val="tx2"/>
-              </a:buClr>
-              <a:buSzPct val="90000"/>
-              <a:buFont typeface="Arial" charset="0"/>
-              <a:buChar char="•"/>
-              <a:defRPr lang="en-US" sz="1500" kern="1200" dirty="0">
-                <a:solidFill>
-                  <a:schemeClr val="tx1"/>
-                </a:solidFill>
-                <a:latin typeface="+mn-lt"/>
-                <a:ea typeface="ＭＳ Ｐゴシック" charset="0"/>
-                <a:cs typeface="CiscoSans"/>
-              </a:defRPr>
-            </a:lvl1pPr>
-            <a:lvl2pPr marL="358775" indent="-215900" algn="l" defTabSz="684213" rtl="0" eaLnBrk="1" fontAlgn="base" hangingPunct="1">
-              <a:lnSpc>
-                <a:spcPct val="95000"/>
-              </a:lnSpc>
-              <a:spcBef>
-                <a:spcPts val="600"/>
-              </a:spcBef>
-              <a:spcAft>
-                <a:spcPct val="0"/>
-              </a:spcAft>
-              <a:buClr>
-                <a:schemeClr val="tx2"/>
-              </a:buClr>
-              <a:buFont typeface="Arial" charset="0"/>
-              <a:buChar char="•"/>
-              <a:defRPr lang="en-US" sz="1400" kern="1200" dirty="0">
-                <a:solidFill>
-                  <a:schemeClr val="tx1"/>
-                </a:solidFill>
-                <a:latin typeface="+mn-lt"/>
-                <a:ea typeface="ＭＳ Ｐゴシック" charset="0"/>
-                <a:cs typeface="CiscoSans"/>
-              </a:defRPr>
-            </a:lvl2pPr>
-            <a:lvl3pPr marL="431800" indent="-169863" algn="l" defTabSz="684213" rtl="0" eaLnBrk="1" fontAlgn="base" hangingPunct="1">
-              <a:lnSpc>
-                <a:spcPct val="95000"/>
-              </a:lnSpc>
-              <a:spcBef>
-                <a:spcPts val="625"/>
-              </a:spcBef>
-              <a:spcAft>
-                <a:spcPct val="0"/>
-              </a:spcAft>
-              <a:buFont typeface="Arial" charset="0"/>
-              <a:buChar char="•"/>
-              <a:defRPr lang="en-US" sz="1200" kern="1200" dirty="0">
-                <a:solidFill>
-                  <a:schemeClr val="tx1"/>
-                </a:solidFill>
-                <a:latin typeface="+mn-lt"/>
-                <a:ea typeface="ＭＳ Ｐゴシック" charset="0"/>
-                <a:cs typeface="CiscoSans"/>
-              </a:defRPr>
-            </a:lvl3pPr>
-            <a:lvl4pPr marL="503238" indent="-169863" algn="l" defTabSz="684213" rtl="0" eaLnBrk="1" fontAlgn="base" hangingPunct="1">
-              <a:lnSpc>
-                <a:spcPct val="95000"/>
-              </a:lnSpc>
-              <a:spcBef>
-                <a:spcPts val="625"/>
-              </a:spcBef>
-              <a:spcAft>
-                <a:spcPct val="0"/>
-              </a:spcAft>
-              <a:buFont typeface="Arial" charset="0"/>
-              <a:buChar char="•"/>
-              <a:defRPr lang="en-US" sz="1100" kern="1200" dirty="0">
-                <a:solidFill>
-                  <a:schemeClr val="tx1"/>
-                </a:solidFill>
-                <a:latin typeface="+mn-lt"/>
-                <a:ea typeface="ＭＳ Ｐゴシック" charset="0"/>
-                <a:cs typeface="CiscoSans"/>
-              </a:defRPr>
-            </a:lvl4pPr>
-            <a:lvl5pPr marL="574675" indent="-169863" algn="l" defTabSz="684213" rtl="0" eaLnBrk="1" fontAlgn="base" hangingPunct="1">
-              <a:lnSpc>
-                <a:spcPct val="95000"/>
-              </a:lnSpc>
-              <a:spcBef>
-                <a:spcPts val="625"/>
-              </a:spcBef>
-              <a:spcAft>
-                <a:spcPct val="0"/>
-              </a:spcAft>
-              <a:buFont typeface="Arial" charset="0"/>
-              <a:buChar char="•"/>
-              <a:defRPr lang="en-US" sz="1100" kern="1200" dirty="0">
-                <a:solidFill>
-                  <a:schemeClr val="tx1"/>
-                </a:solidFill>
-                <a:latin typeface="+mn-lt"/>
-                <a:ea typeface="ＭＳ Ｐゴシック" charset="0"/>
-                <a:cs typeface="CiscoSans"/>
-              </a:defRPr>
-            </a:lvl5pPr>
-            <a:lvl6pPr marL="863856" indent="-171445" algn="l" defTabSz="685777" rtl="0" eaLnBrk="1" latinLnBrk="0" hangingPunct="1">
-              <a:spcBef>
-                <a:spcPts val="600"/>
-              </a:spcBef>
-              <a:buFont typeface="Arial" pitchFamily="34" charset="0"/>
-              <a:buChar char="•"/>
-              <a:defRPr sz="900" kern="1200" baseline="0">
-                <a:solidFill>
-                  <a:schemeClr val="tx1"/>
-                </a:solidFill>
-                <a:latin typeface="+mn-lt"/>
-                <a:ea typeface="+mn-ea"/>
-                <a:cs typeface="+mn-cs"/>
-              </a:defRPr>
-            </a:lvl6pPr>
-            <a:lvl7pPr marL="935844" indent="-171422" algn="l" defTabSz="685777" rtl="0" eaLnBrk="1" latinLnBrk="0" hangingPunct="1">
-              <a:spcBef>
-                <a:spcPts val="600"/>
-              </a:spcBef>
-              <a:buFont typeface="Arial" pitchFamily="34" charset="0"/>
-              <a:buChar char="•"/>
-              <a:defRPr sz="800" kern="1200" baseline="0">
-                <a:solidFill>
-                  <a:schemeClr val="tx1"/>
-                </a:solidFill>
-                <a:latin typeface="+mn-lt"/>
-                <a:ea typeface="+mn-ea"/>
-                <a:cs typeface="+mn-cs"/>
-              </a:defRPr>
-            </a:lvl7pPr>
-            <a:lvl8pPr marL="2400220" indent="0" algn="l" defTabSz="685777" rtl="0" eaLnBrk="1" latinLnBrk="0" hangingPunct="1">
-              <a:spcBef>
-                <a:spcPct val="20000"/>
-              </a:spcBef>
-              <a:buFont typeface="Arial" pitchFamily="34" charset="0"/>
-              <a:buNone/>
-              <a:defRPr sz="1500" kern="1200">
-                <a:solidFill>
-                  <a:schemeClr val="tx1"/>
-                </a:solidFill>
-                <a:latin typeface="+mn-lt"/>
-                <a:ea typeface="+mn-ea"/>
-                <a:cs typeface="+mn-cs"/>
-              </a:defRPr>
-            </a:lvl8pPr>
-            <a:lvl9pPr marL="2914553" indent="-171445" algn="l" defTabSz="685777" rtl="0" eaLnBrk="1" latinLnBrk="0" hangingPunct="1">
-              <a:spcBef>
-                <a:spcPct val="20000"/>
-              </a:spcBef>
-              <a:buFont typeface="Arial" pitchFamily="34" charset="0"/>
-              <a:buChar char="•"/>
-              <a:defRPr sz="1500" kern="1200">
-                <a:solidFill>
-                  <a:schemeClr val="tx1"/>
-                </a:solidFill>
-                <a:latin typeface="+mn-lt"/>
-                <a:ea typeface="+mn-ea"/>
-                <a:cs typeface="+mn-cs"/>
-              </a:defRPr>
-            </a:lvl9pPr>
-          </a:lstStyle>
-          <a:p>
-            <a:pPr marL="0" indent="0" algn="ctr">
-              <a:buFont typeface="Arial" charset="0"/>
-              <a:buNone/>
-            </a:pPr>
-            <a:r>
-              <a:rPr lang="it-IT" sz="2000" dirty="0">
-                <a:solidFill>
-                  <a:srgbClr val="92D050"/>
-                </a:solidFill>
-              </a:rPr>
-              <a:t>Using Git with servers </a:t>
-            </a:r>
-          </a:p>
-          <a:p>
-            <a:pPr marL="0" indent="0" algn="ctr">
-              <a:buFont typeface="Arial" charset="0"/>
-              <a:buNone/>
-            </a:pPr>
-            <a:endParaRPr lang="it-IT" sz="2000" dirty="0">
+            <a:endParaRPr sz="3899" dirty="0">
               <a:solidFill>
-                <a:srgbClr val="92D050"/>
+                <a:schemeClr val="bg1"/>
               </a:solidFill>
+              <a:latin typeface="CiscoSansTT Light" panose="020B0503020201020303" pitchFamily="34" charset="0"/>
             </a:endParaRPr>
-          </a:p>
-          <a:p>
-            <a:pPr marL="0" indent="0" algn="ctr">
-              <a:buFont typeface="Arial" charset="0"/>
-              <a:buNone/>
-            </a:pPr>
-            <a:r>
-              <a:rPr lang="it-IT" sz="2000" dirty="0">
-                <a:solidFill>
-                  <a:srgbClr val="92D050"/>
-                </a:solidFill>
-              </a:rPr>
-              <a:t>Learn how to use Git with servers to share your work with others.</a:t>
-            </a:r>
-          </a:p>
-        </p:txBody>
-      </p:sp>
-      <p:sp>
-        <p:nvSpPr>
-          <p:cNvPr id="14" name="Circle">
-            <a:extLst>
-              <a:ext uri="{FF2B5EF4-FFF2-40B4-BE49-F238E27FC236}">
-                <a16:creationId xmlns:a16="http://schemas.microsoft.com/office/drawing/2014/main" id="{07195FD6-A87E-7201-ED77-CFBF60C47C8A}"/>
-              </a:ext>
-            </a:extLst>
-          </p:cNvPr>
-          <p:cNvSpPr/>
-          <p:nvPr/>
-        </p:nvSpPr>
-        <p:spPr>
-          <a:xfrm>
-            <a:off x="8088246" y="1805658"/>
-            <a:ext cx="859516" cy="859740"/>
-          </a:xfrm>
-          <a:prstGeom prst="ellipse">
-            <a:avLst/>
-          </a:prstGeom>
-          <a:solidFill>
-            <a:schemeClr val="accent3"/>
-          </a:solidFill>
-          <a:ln w="12700">
-            <a:miter lim="400000"/>
-          </a:ln>
-        </p:spPr>
-        <p:txBody>
-          <a:bodyPr tIns="45708" bIns="45708" anchor="ctr"/>
-          <a:lstStyle/>
-          <a:p>
-            <a:pPr defTabSz="911873">
-              <a:defRPr sz="5000">
-                <a:solidFill>
-                  <a:schemeClr val="accent3">
-                    <a:hueOff val="937500"/>
-                    <a:satOff val="68855"/>
-                    <a:lumOff val="-8431"/>
-                  </a:schemeClr>
-                </a:solidFill>
-              </a:defRPr>
-            </a:pPr>
-            <a:endParaRPr sz="2500" dirty="0"/>
-          </a:p>
-        </p:txBody>
-      </p:sp>
-      <p:sp>
-        <p:nvSpPr>
-          <p:cNvPr id="15" name="3">
-            <a:extLst>
-              <a:ext uri="{FF2B5EF4-FFF2-40B4-BE49-F238E27FC236}">
-                <a16:creationId xmlns:a16="http://schemas.microsoft.com/office/drawing/2014/main" id="{A95A6516-29A5-E1C7-DE2D-9D2BE8EEE3CF}"/>
-              </a:ext>
-            </a:extLst>
-          </p:cNvPr>
-          <p:cNvSpPr txBox="1"/>
-          <p:nvPr/>
-        </p:nvSpPr>
-        <p:spPr>
-          <a:xfrm>
-            <a:off x="8287507" y="1830979"/>
-            <a:ext cx="484427" cy="692345"/>
-          </a:xfrm>
-          <a:prstGeom prst="rect">
-            <a:avLst/>
-          </a:prstGeom>
-          <a:ln w="25400">
-            <a:miter lim="400000"/>
-          </a:ln>
-          <a:extLst>
-            <a:ext uri="{C572A759-6A51-4108-AA02-DFA0A04FC94B}">
-              <ma14:wrappingTextBoxFlag xmlns="" xmlns:m="http://schemas.openxmlformats.org/officeDocument/2006/math" xmlns:a14="http://schemas.microsoft.com/office/drawing/2010/main" xmlns:ma14="http://schemas.microsoft.com/office/mac/drawingml/2011/main" val="1"/>
-            </a:ext>
-          </a:extLst>
-        </p:spPr>
-        <p:txBody>
-          <a:bodyPr wrap="square" tIns="45708" bIns="45708" anchor="ctr">
-            <a:spAutoFit/>
-          </a:bodyPr>
-          <a:lstStyle>
-            <a:lvl1pPr algn="ctr">
-              <a:defRPr sz="7800">
-                <a:solidFill>
-                  <a:schemeClr val="accent3">
-                    <a:hueOff val="937500"/>
-                    <a:satOff val="68855"/>
-                    <a:lumOff val="-8431"/>
-                  </a:schemeClr>
-                </a:solidFill>
-                <a:latin typeface="+mj-lt"/>
-                <a:ea typeface="+mj-ea"/>
-                <a:cs typeface="+mj-cs"/>
-                <a:sym typeface="CiscoSansTT Light"/>
-              </a:defRPr>
-            </a:lvl1pPr>
-          </a:lstStyle>
-          <a:p>
-            <a:r>
-              <a:rPr sz="3899" dirty="0">
-                <a:solidFill>
-                  <a:schemeClr val="bg1"/>
-                </a:solidFill>
-                <a:latin typeface="CiscoSansTT Light" panose="020B0503020201020303" pitchFamily="34" charset="0"/>
-              </a:rPr>
-              <a:t>3</a:t>
-            </a:r>
           </a:p>
         </p:txBody>
       </p:sp>
@@ -10005,1064 +8988,6 @@
     <p:extLst>
       <p:ext uri="{BB962C8B-B14F-4D97-AF65-F5344CB8AC3E}">
         <p14:creationId xmlns:p14="http://schemas.microsoft.com/office/powerpoint/2010/main" val="1638533772"/>
-      </p:ext>
-    </p:extLst>
-  </p:cSld>
-  <p:clrMapOvr>
-    <a:masterClrMapping/>
-  </p:clrMapOvr>
-</p:sld>
-</file>
-
-<file path=ppt/slides/slide20.xml><?xml version="1.0" encoding="utf-8"?>
-<p:sld xmlns:a="http://schemas.openxmlformats.org/drawingml/2006/main" xmlns:r="http://schemas.openxmlformats.org/officeDocument/2006/relationships" xmlns:p="http://schemas.openxmlformats.org/presentationml/2006/main">
-  <p:cSld>
-    <p:spTree>
-      <p:nvGrpSpPr>
-        <p:cNvPr id="1" name=""/>
-        <p:cNvGrpSpPr/>
-        <p:nvPr/>
-      </p:nvGrpSpPr>
-      <p:grpSpPr>
-        <a:xfrm>
-          <a:off x="0" y="0"/>
-          <a:ext cx="0" cy="0"/>
-          <a:chOff x="0" y="0"/>
-          <a:chExt cx="0" cy="0"/>
-        </a:xfrm>
-      </p:grpSpPr>
-      <p:sp>
-        <p:nvSpPr>
-          <p:cNvPr id="2" name="Title 1">
-            <a:extLst>
-              <a:ext uri="{FF2B5EF4-FFF2-40B4-BE49-F238E27FC236}">
-                <a16:creationId xmlns:a16="http://schemas.microsoft.com/office/drawing/2014/main" id="{E19D7288-EEA9-673C-2648-E31357ECFB66}"/>
-              </a:ext>
-            </a:extLst>
-          </p:cNvPr>
-          <p:cNvSpPr>
-            <a:spLocks noGrp="1"/>
-          </p:cNvSpPr>
-          <p:nvPr>
-            <p:ph type="title"/>
-          </p:nvPr>
-        </p:nvSpPr>
-        <p:spPr/>
-        <p:txBody>
-          <a:bodyPr/>
-          <a:lstStyle/>
-          <a:p>
-            <a:endParaRPr lang="en-US"/>
-          </a:p>
-        </p:txBody>
-      </p:sp>
-      <p:sp>
-        <p:nvSpPr>
-          <p:cNvPr id="3" name="Text Placeholder 2">
-            <a:extLst>
-              <a:ext uri="{FF2B5EF4-FFF2-40B4-BE49-F238E27FC236}">
-                <a16:creationId xmlns:a16="http://schemas.microsoft.com/office/drawing/2014/main" id="{87157810-2CF8-86FF-7A0A-5100EE9E1347}"/>
-              </a:ext>
-            </a:extLst>
-          </p:cNvPr>
-          <p:cNvSpPr>
-            <a:spLocks noGrp="1"/>
-          </p:cNvSpPr>
-          <p:nvPr>
-            <p:ph type="body" idx="1"/>
-          </p:nvPr>
-        </p:nvSpPr>
-        <p:spPr/>
-        <p:txBody>
-          <a:bodyPr/>
-          <a:lstStyle/>
-          <a:p>
-            <a:endParaRPr lang="en-US"/>
-          </a:p>
-        </p:txBody>
-      </p:sp>
-      <p:sp>
-        <p:nvSpPr>
-          <p:cNvPr id="4" name="Content Placeholder 3">
-            <a:extLst>
-              <a:ext uri="{FF2B5EF4-FFF2-40B4-BE49-F238E27FC236}">
-                <a16:creationId xmlns:a16="http://schemas.microsoft.com/office/drawing/2014/main" id="{B8C40628-4076-37D3-FC34-5F636415D8DE}"/>
-              </a:ext>
-            </a:extLst>
-          </p:cNvPr>
-          <p:cNvSpPr>
-            <a:spLocks noGrp="1"/>
-          </p:cNvSpPr>
-          <p:nvPr>
-            <p:ph sz="half" idx="2"/>
-          </p:nvPr>
-        </p:nvSpPr>
-        <p:spPr/>
-        <p:txBody>
-          <a:bodyPr/>
-          <a:lstStyle/>
-          <a:p>
-            <a:endParaRPr lang="en-US"/>
-          </a:p>
-        </p:txBody>
-      </p:sp>
-      <p:sp>
-        <p:nvSpPr>
-          <p:cNvPr id="5" name="Text Placeholder 4">
-            <a:extLst>
-              <a:ext uri="{FF2B5EF4-FFF2-40B4-BE49-F238E27FC236}">
-                <a16:creationId xmlns:a16="http://schemas.microsoft.com/office/drawing/2014/main" id="{57B4F89D-2433-3DC9-DC94-2F934F297D5D}"/>
-              </a:ext>
-            </a:extLst>
-          </p:cNvPr>
-          <p:cNvSpPr>
-            <a:spLocks noGrp="1"/>
-          </p:cNvSpPr>
-          <p:nvPr>
-            <p:ph type="body" sz="quarter" idx="3"/>
-          </p:nvPr>
-        </p:nvSpPr>
-        <p:spPr/>
-        <p:txBody>
-          <a:bodyPr/>
-          <a:lstStyle/>
-          <a:p>
-            <a:endParaRPr lang="en-US"/>
-          </a:p>
-        </p:txBody>
-      </p:sp>
-      <p:sp>
-        <p:nvSpPr>
-          <p:cNvPr id="6" name="Content Placeholder 5">
-            <a:extLst>
-              <a:ext uri="{FF2B5EF4-FFF2-40B4-BE49-F238E27FC236}">
-                <a16:creationId xmlns:a16="http://schemas.microsoft.com/office/drawing/2014/main" id="{6649F256-25A2-C5E2-DEE4-844A248014B2}"/>
-              </a:ext>
-            </a:extLst>
-          </p:cNvPr>
-          <p:cNvSpPr>
-            <a:spLocks noGrp="1"/>
-          </p:cNvSpPr>
-          <p:nvPr>
-            <p:ph sz="quarter" idx="4"/>
-          </p:nvPr>
-        </p:nvSpPr>
-        <p:spPr/>
-        <p:txBody>
-          <a:bodyPr/>
-          <a:lstStyle/>
-          <a:p>
-            <a:endParaRPr lang="en-US"/>
-          </a:p>
-        </p:txBody>
-      </p:sp>
-    </p:spTree>
-    <p:extLst>
-      <p:ext uri="{BB962C8B-B14F-4D97-AF65-F5344CB8AC3E}">
-        <p14:creationId xmlns:p14="http://schemas.microsoft.com/office/powerpoint/2010/main" val="3587843391"/>
-      </p:ext>
-    </p:extLst>
-  </p:cSld>
-  <p:clrMapOvr>
-    <a:masterClrMapping/>
-  </p:clrMapOvr>
-</p:sld>
-</file>
-
-<file path=ppt/slides/slide21.xml><?xml version="1.0" encoding="utf-8"?>
-<p:sld xmlns:a="http://schemas.openxmlformats.org/drawingml/2006/main" xmlns:r="http://schemas.openxmlformats.org/officeDocument/2006/relationships" xmlns:p="http://schemas.openxmlformats.org/presentationml/2006/main">
-  <p:cSld>
-    <p:bg>
-      <p:bgPr>
-        <a:blipFill dpi="0" rotWithShape="1">
-          <a:blip r:embed="rId3">
-            <a:alphaModFix amt="69142"/>
-            <a:lum/>
-            <a:extLst>
-              <a:ext uri="{BEBA8EAE-BF5A-486C-A8C5-ECC9F3942E4B}">
-                <a14:imgProps xmlns:a14="http://schemas.microsoft.com/office/drawing/2010/main">
-                  <a14:imgLayer r:embed="rId4">
-                    <a14:imgEffect>
-                      <a14:artisticPastelsSmooth/>
-                    </a14:imgEffect>
-                  </a14:imgLayer>
-                </a14:imgProps>
-              </a:ext>
-            </a:extLst>
-          </a:blip>
-          <a:srcRect/>
-          <a:tile tx="0" ty="0" sx="100000" sy="100000" flip="none" algn="tl"/>
-        </a:blipFill>
-        <a:effectLst/>
-      </p:bgPr>
-    </p:bg>
-    <p:spTree>
-      <p:nvGrpSpPr>
-        <p:cNvPr id="1" name=""/>
-        <p:cNvGrpSpPr/>
-        <p:nvPr/>
-      </p:nvGrpSpPr>
-      <p:grpSpPr>
-        <a:xfrm>
-          <a:off x="0" y="0"/>
-          <a:ext cx="0" cy="0"/>
-          <a:chOff x="0" y="0"/>
-          <a:chExt cx="0" cy="0"/>
-        </a:xfrm>
-      </p:grpSpPr>
-      <p:sp>
-        <p:nvSpPr>
-          <p:cNvPr id="2" name="Title 1">
-            <a:extLst>
-              <a:ext uri="{FF2B5EF4-FFF2-40B4-BE49-F238E27FC236}">
-                <a16:creationId xmlns:a16="http://schemas.microsoft.com/office/drawing/2014/main" id="{C806E4C1-A41D-067E-F34B-92081CC326A2}"/>
-              </a:ext>
-            </a:extLst>
-          </p:cNvPr>
-          <p:cNvSpPr>
-            <a:spLocks noGrp="1"/>
-          </p:cNvSpPr>
-          <p:nvPr>
-            <p:ph type="title"/>
-          </p:nvPr>
-        </p:nvSpPr>
-        <p:spPr/>
-        <p:txBody>
-          <a:bodyPr/>
-          <a:lstStyle/>
-          <a:p>
-            <a:r>
-              <a:rPr lang="en-US" dirty="0"/>
-              <a:t>Section Header</a:t>
-            </a:r>
-          </a:p>
-        </p:txBody>
-      </p:sp>
-      <p:sp>
-        <p:nvSpPr>
-          <p:cNvPr id="3" name="Text Placeholder 2">
-            <a:extLst>
-              <a:ext uri="{FF2B5EF4-FFF2-40B4-BE49-F238E27FC236}">
-                <a16:creationId xmlns:a16="http://schemas.microsoft.com/office/drawing/2014/main" id="{35DE4B70-3814-7353-ED57-8DA4CECE5158}"/>
-              </a:ext>
-            </a:extLst>
-          </p:cNvPr>
-          <p:cNvSpPr>
-            <a:spLocks noGrp="1"/>
-          </p:cNvSpPr>
-          <p:nvPr>
-            <p:ph type="body" idx="1"/>
-          </p:nvPr>
-        </p:nvSpPr>
-        <p:spPr/>
-        <p:txBody>
-          <a:bodyPr/>
-          <a:lstStyle/>
-          <a:p>
-            <a:endParaRPr lang="en-US" dirty="0"/>
-          </a:p>
-        </p:txBody>
-      </p:sp>
-    </p:spTree>
-    <p:extLst>
-      <p:ext uri="{BB962C8B-B14F-4D97-AF65-F5344CB8AC3E}">
-        <p14:creationId xmlns:p14="http://schemas.microsoft.com/office/powerpoint/2010/main" val="2540633462"/>
-      </p:ext>
-    </p:extLst>
-  </p:cSld>
-  <p:clrMapOvr>
-    <a:masterClrMapping/>
-  </p:clrMapOvr>
-</p:sld>
-</file>
-
-<file path=ppt/slides/slide22.xml><?xml version="1.0" encoding="utf-8"?>
-<p:sld xmlns:a="http://schemas.openxmlformats.org/drawingml/2006/main" xmlns:r="http://schemas.openxmlformats.org/officeDocument/2006/relationships" xmlns:p="http://schemas.openxmlformats.org/presentationml/2006/main">
-  <p:cSld>
-    <p:bg>
-      <p:bgPr>
-        <a:blipFill dpi="0" rotWithShape="1">
-          <a:blip r:embed="rId3">
-            <a:alphaModFix amt="69142"/>
-            <a:lum/>
-            <a:extLst>
-              <a:ext uri="{BEBA8EAE-BF5A-486C-A8C5-ECC9F3942E4B}">
-                <a14:imgProps xmlns:a14="http://schemas.microsoft.com/office/drawing/2010/main">
-                  <a14:imgLayer r:embed="rId4">
-                    <a14:imgEffect>
-                      <a14:artisticPastelsSmooth/>
-                    </a14:imgEffect>
-                  </a14:imgLayer>
-                </a14:imgProps>
-              </a:ext>
-            </a:extLst>
-          </a:blip>
-          <a:srcRect/>
-          <a:tile tx="0" ty="0" sx="100000" sy="100000" flip="none" algn="tl"/>
-        </a:blipFill>
-        <a:effectLst/>
-      </p:bgPr>
-    </p:bg>
-    <p:spTree>
-      <p:nvGrpSpPr>
-        <p:cNvPr id="1" name=""/>
-        <p:cNvGrpSpPr/>
-        <p:nvPr/>
-      </p:nvGrpSpPr>
-      <p:grpSpPr>
-        <a:xfrm>
-          <a:off x="0" y="0"/>
-          <a:ext cx="0" cy="0"/>
-          <a:chOff x="0" y="0"/>
-          <a:chExt cx="0" cy="0"/>
-        </a:xfrm>
-      </p:grpSpPr>
-      <p:sp>
-        <p:nvSpPr>
-          <p:cNvPr id="2" name="Title 1">
-            <a:extLst>
-              <a:ext uri="{FF2B5EF4-FFF2-40B4-BE49-F238E27FC236}">
-                <a16:creationId xmlns:a16="http://schemas.microsoft.com/office/drawing/2014/main" id="{C806E4C1-A41D-067E-F34B-92081CC326A2}"/>
-              </a:ext>
-            </a:extLst>
-          </p:cNvPr>
-          <p:cNvSpPr>
-            <a:spLocks noGrp="1"/>
-          </p:cNvSpPr>
-          <p:nvPr>
-            <p:ph type="title"/>
-          </p:nvPr>
-        </p:nvSpPr>
-        <p:spPr/>
-        <p:txBody>
-          <a:bodyPr/>
-          <a:lstStyle/>
-          <a:p>
-            <a:r>
-              <a:rPr lang="en-US" dirty="0"/>
-              <a:t>Section Header</a:t>
-            </a:r>
-          </a:p>
-        </p:txBody>
-      </p:sp>
-      <p:sp>
-        <p:nvSpPr>
-          <p:cNvPr id="3" name="Text Placeholder 2">
-            <a:extLst>
-              <a:ext uri="{FF2B5EF4-FFF2-40B4-BE49-F238E27FC236}">
-                <a16:creationId xmlns:a16="http://schemas.microsoft.com/office/drawing/2014/main" id="{35DE4B70-3814-7353-ED57-8DA4CECE5158}"/>
-              </a:ext>
-            </a:extLst>
-          </p:cNvPr>
-          <p:cNvSpPr>
-            <a:spLocks noGrp="1"/>
-          </p:cNvSpPr>
-          <p:nvPr>
-            <p:ph type="body" idx="1"/>
-          </p:nvPr>
-        </p:nvSpPr>
-        <p:spPr/>
-        <p:txBody>
-          <a:bodyPr/>
-          <a:lstStyle/>
-          <a:p>
-            <a:endParaRPr lang="en-US"/>
-          </a:p>
-        </p:txBody>
-      </p:sp>
-    </p:spTree>
-    <p:extLst>
-      <p:ext uri="{BB962C8B-B14F-4D97-AF65-F5344CB8AC3E}">
-        <p14:creationId xmlns:p14="http://schemas.microsoft.com/office/powerpoint/2010/main" val="1695612300"/>
-      </p:ext>
-    </p:extLst>
-  </p:cSld>
-  <p:clrMapOvr>
-    <a:masterClrMapping/>
-  </p:clrMapOvr>
-</p:sld>
-</file>
-
-<file path=ppt/slides/slide23.xml><?xml version="1.0" encoding="utf-8"?>
-<p:sld xmlns:a="http://schemas.openxmlformats.org/drawingml/2006/main" xmlns:r="http://schemas.openxmlformats.org/officeDocument/2006/relationships" xmlns:p="http://schemas.openxmlformats.org/presentationml/2006/main">
-  <p:cSld>
-    <p:spTree>
-      <p:nvGrpSpPr>
-        <p:cNvPr id="1" name=""/>
-        <p:cNvGrpSpPr/>
-        <p:nvPr/>
-      </p:nvGrpSpPr>
-      <p:grpSpPr>
-        <a:xfrm>
-          <a:off x="0" y="0"/>
-          <a:ext cx="0" cy="0"/>
-          <a:chOff x="0" y="0"/>
-          <a:chExt cx="0" cy="0"/>
-        </a:xfrm>
-      </p:grpSpPr>
-      <p:sp>
-        <p:nvSpPr>
-          <p:cNvPr id="2" name="Title 1">
-            <a:extLst>
-              <a:ext uri="{FF2B5EF4-FFF2-40B4-BE49-F238E27FC236}">
-                <a16:creationId xmlns:a16="http://schemas.microsoft.com/office/drawing/2014/main" id="{B96695EC-3AC3-DE02-D0CC-B2F2400B0DCD}"/>
-              </a:ext>
-            </a:extLst>
-          </p:cNvPr>
-          <p:cNvSpPr>
-            <a:spLocks noGrp="1"/>
-          </p:cNvSpPr>
-          <p:nvPr>
-            <p:ph type="title"/>
-          </p:nvPr>
-        </p:nvSpPr>
-        <p:spPr/>
-        <p:txBody>
-          <a:bodyPr/>
-          <a:lstStyle/>
-          <a:p>
-            <a:endParaRPr lang="en-US"/>
-          </a:p>
-        </p:txBody>
-      </p:sp>
-      <p:sp>
-        <p:nvSpPr>
-          <p:cNvPr id="3" name="Picture Placeholder 2">
-            <a:extLst>
-              <a:ext uri="{FF2B5EF4-FFF2-40B4-BE49-F238E27FC236}">
-                <a16:creationId xmlns:a16="http://schemas.microsoft.com/office/drawing/2014/main" id="{5E9071ED-BC3F-FDA1-1BDD-835886C96FAD}"/>
-              </a:ext>
-            </a:extLst>
-          </p:cNvPr>
-          <p:cNvSpPr>
-            <a:spLocks noGrp="1"/>
-          </p:cNvSpPr>
-          <p:nvPr>
-            <p:ph type="pic" idx="1"/>
-          </p:nvPr>
-        </p:nvSpPr>
-        <p:spPr/>
-        <p:txBody>
-          <a:bodyPr/>
-          <a:lstStyle/>
-          <a:p>
-            <a:endParaRPr lang="en-US"/>
-          </a:p>
-        </p:txBody>
-      </p:sp>
-      <p:sp>
-        <p:nvSpPr>
-          <p:cNvPr id="4" name="Text Placeholder 3">
-            <a:extLst>
-              <a:ext uri="{FF2B5EF4-FFF2-40B4-BE49-F238E27FC236}">
-                <a16:creationId xmlns:a16="http://schemas.microsoft.com/office/drawing/2014/main" id="{240FC0BA-1C51-E881-F515-D3CC98046CF0}"/>
-              </a:ext>
-            </a:extLst>
-          </p:cNvPr>
-          <p:cNvSpPr>
-            <a:spLocks noGrp="1"/>
-          </p:cNvSpPr>
-          <p:nvPr>
-            <p:ph type="body" sz="half" idx="2"/>
-          </p:nvPr>
-        </p:nvSpPr>
-        <p:spPr/>
-        <p:txBody>
-          <a:bodyPr/>
-          <a:lstStyle/>
-          <a:p>
-            <a:endParaRPr lang="en-US"/>
-          </a:p>
-        </p:txBody>
-      </p:sp>
-    </p:spTree>
-    <p:extLst>
-      <p:ext uri="{BB962C8B-B14F-4D97-AF65-F5344CB8AC3E}">
-        <p14:creationId xmlns:p14="http://schemas.microsoft.com/office/powerpoint/2010/main" val="3963377862"/>
-      </p:ext>
-    </p:extLst>
-  </p:cSld>
-  <p:clrMapOvr>
-    <a:masterClrMapping/>
-  </p:clrMapOvr>
-</p:sld>
-</file>
-
-<file path=ppt/slides/slide24.xml><?xml version="1.0" encoding="utf-8"?>
-<p:sld xmlns:a="http://schemas.openxmlformats.org/drawingml/2006/main" xmlns:r="http://schemas.openxmlformats.org/officeDocument/2006/relationships" xmlns:p="http://schemas.openxmlformats.org/presentationml/2006/main">
-  <p:cSld>
-    <p:spTree>
-      <p:nvGrpSpPr>
-        <p:cNvPr id="1" name=""/>
-        <p:cNvGrpSpPr/>
-        <p:nvPr/>
-      </p:nvGrpSpPr>
-      <p:grpSpPr>
-        <a:xfrm>
-          <a:off x="0" y="0"/>
-          <a:ext cx="0" cy="0"/>
-          <a:chOff x="0" y="0"/>
-          <a:chExt cx="0" cy="0"/>
-        </a:xfrm>
-      </p:grpSpPr>
-      <p:sp>
-        <p:nvSpPr>
-          <p:cNvPr id="2" name="Title 1">
-            <a:extLst>
-              <a:ext uri="{FF2B5EF4-FFF2-40B4-BE49-F238E27FC236}">
-                <a16:creationId xmlns:a16="http://schemas.microsoft.com/office/drawing/2014/main" id="{18F3C9F8-441D-0553-285F-75FEC55EA5A9}"/>
-              </a:ext>
-            </a:extLst>
-          </p:cNvPr>
-          <p:cNvSpPr>
-            <a:spLocks noGrp="1"/>
-          </p:cNvSpPr>
-          <p:nvPr>
-            <p:ph type="title"/>
-          </p:nvPr>
-        </p:nvSpPr>
-        <p:spPr/>
-        <p:txBody>
-          <a:bodyPr/>
-          <a:lstStyle/>
-          <a:p>
-            <a:endParaRPr lang="en-US"/>
-          </a:p>
-        </p:txBody>
-      </p:sp>
-      <p:sp>
-        <p:nvSpPr>
-          <p:cNvPr id="3" name="Picture Placeholder 2">
-            <a:extLst>
-              <a:ext uri="{FF2B5EF4-FFF2-40B4-BE49-F238E27FC236}">
-                <a16:creationId xmlns:a16="http://schemas.microsoft.com/office/drawing/2014/main" id="{AAB16E34-B5A2-9EC8-29CD-BFCB040EB6C2}"/>
-              </a:ext>
-            </a:extLst>
-          </p:cNvPr>
-          <p:cNvSpPr>
-            <a:spLocks noGrp="1"/>
-          </p:cNvSpPr>
-          <p:nvPr>
-            <p:ph type="pic" idx="1"/>
-          </p:nvPr>
-        </p:nvSpPr>
-        <p:spPr/>
-        <p:txBody>
-          <a:bodyPr/>
-          <a:lstStyle/>
-          <a:p>
-            <a:endParaRPr lang="en-US"/>
-          </a:p>
-        </p:txBody>
-      </p:sp>
-      <p:sp>
-        <p:nvSpPr>
-          <p:cNvPr id="4" name="Text Placeholder 3">
-            <a:extLst>
-              <a:ext uri="{FF2B5EF4-FFF2-40B4-BE49-F238E27FC236}">
-                <a16:creationId xmlns:a16="http://schemas.microsoft.com/office/drawing/2014/main" id="{0F24036D-7AA1-8186-5F50-47756ABD1971}"/>
-              </a:ext>
-            </a:extLst>
-          </p:cNvPr>
-          <p:cNvSpPr>
-            <a:spLocks noGrp="1"/>
-          </p:cNvSpPr>
-          <p:nvPr>
-            <p:ph type="body" sz="half" idx="2"/>
-          </p:nvPr>
-        </p:nvSpPr>
-        <p:spPr/>
-        <p:txBody>
-          <a:bodyPr/>
-          <a:lstStyle/>
-          <a:p>
-            <a:endParaRPr lang="en-US"/>
-          </a:p>
-        </p:txBody>
-      </p:sp>
-    </p:spTree>
-    <p:extLst>
-      <p:ext uri="{BB962C8B-B14F-4D97-AF65-F5344CB8AC3E}">
-        <p14:creationId xmlns:p14="http://schemas.microsoft.com/office/powerpoint/2010/main" val="3285076764"/>
-      </p:ext>
-    </p:extLst>
-  </p:cSld>
-  <p:clrMapOvr>
-    <a:masterClrMapping/>
-  </p:clrMapOvr>
-</p:sld>
-</file>
-
-<file path=ppt/slides/slide25.xml><?xml version="1.0" encoding="utf-8"?>
-<p:sld xmlns:a="http://schemas.openxmlformats.org/drawingml/2006/main" xmlns:r="http://schemas.openxmlformats.org/officeDocument/2006/relationships" xmlns:p="http://schemas.openxmlformats.org/presentationml/2006/main">
-  <p:cSld>
-    <p:bg>
-      <p:bgPr>
-        <a:blipFill dpi="0" rotWithShape="1">
-          <a:blip r:embed="rId3">
-            <a:alphaModFix amt="69142"/>
-            <a:lum/>
-            <a:extLst>
-              <a:ext uri="{BEBA8EAE-BF5A-486C-A8C5-ECC9F3942E4B}">
-                <a14:imgProps xmlns:a14="http://schemas.microsoft.com/office/drawing/2010/main">
-                  <a14:imgLayer r:embed="rId4">
-                    <a14:imgEffect>
-                      <a14:artisticPastelsSmooth/>
-                    </a14:imgEffect>
-                  </a14:imgLayer>
-                </a14:imgProps>
-              </a:ext>
-            </a:extLst>
-          </a:blip>
-          <a:srcRect/>
-          <a:tile tx="0" ty="0" sx="100000" sy="100000" flip="none" algn="tl"/>
-        </a:blipFill>
-        <a:effectLst/>
-      </p:bgPr>
-    </p:bg>
-    <p:spTree>
-      <p:nvGrpSpPr>
-        <p:cNvPr id="1" name=""/>
-        <p:cNvGrpSpPr/>
-        <p:nvPr/>
-      </p:nvGrpSpPr>
-      <p:grpSpPr>
-        <a:xfrm>
-          <a:off x="0" y="0"/>
-          <a:ext cx="0" cy="0"/>
-          <a:chOff x="0" y="0"/>
-          <a:chExt cx="0" cy="0"/>
-        </a:xfrm>
-      </p:grpSpPr>
-      <p:sp>
-        <p:nvSpPr>
-          <p:cNvPr id="2" name="Title 1">
-            <a:extLst>
-              <a:ext uri="{FF2B5EF4-FFF2-40B4-BE49-F238E27FC236}">
-                <a16:creationId xmlns:a16="http://schemas.microsoft.com/office/drawing/2014/main" id="{C806E4C1-A41D-067E-F34B-92081CC326A2}"/>
-              </a:ext>
-            </a:extLst>
-          </p:cNvPr>
-          <p:cNvSpPr>
-            <a:spLocks noGrp="1"/>
-          </p:cNvSpPr>
-          <p:nvPr>
-            <p:ph type="title"/>
-          </p:nvPr>
-        </p:nvSpPr>
-        <p:spPr/>
-        <p:txBody>
-          <a:bodyPr/>
-          <a:lstStyle/>
-          <a:p>
-            <a:r>
-              <a:rPr lang="en-US" dirty="0"/>
-              <a:t>Section Header</a:t>
-            </a:r>
-          </a:p>
-        </p:txBody>
-      </p:sp>
-      <p:sp>
-        <p:nvSpPr>
-          <p:cNvPr id="3" name="Text Placeholder 2">
-            <a:extLst>
-              <a:ext uri="{FF2B5EF4-FFF2-40B4-BE49-F238E27FC236}">
-                <a16:creationId xmlns:a16="http://schemas.microsoft.com/office/drawing/2014/main" id="{35DE4B70-3814-7353-ED57-8DA4CECE5158}"/>
-              </a:ext>
-            </a:extLst>
-          </p:cNvPr>
-          <p:cNvSpPr>
-            <a:spLocks noGrp="1"/>
-          </p:cNvSpPr>
-          <p:nvPr>
-            <p:ph type="body" idx="1"/>
-          </p:nvPr>
-        </p:nvSpPr>
-        <p:spPr/>
-        <p:txBody>
-          <a:bodyPr/>
-          <a:lstStyle/>
-          <a:p>
-            <a:endParaRPr lang="en-US"/>
-          </a:p>
-        </p:txBody>
-      </p:sp>
-    </p:spTree>
-    <p:extLst>
-      <p:ext uri="{BB962C8B-B14F-4D97-AF65-F5344CB8AC3E}">
-        <p14:creationId xmlns:p14="http://schemas.microsoft.com/office/powerpoint/2010/main" val="1372829529"/>
-      </p:ext>
-    </p:extLst>
-  </p:cSld>
-  <p:clrMapOvr>
-    <a:masterClrMapping/>
-  </p:clrMapOvr>
-</p:sld>
-</file>
-
-<file path=ppt/slides/slide26.xml><?xml version="1.0" encoding="utf-8"?>
-<p:sld xmlns:a="http://schemas.openxmlformats.org/drawingml/2006/main" xmlns:r="http://schemas.openxmlformats.org/officeDocument/2006/relationships" xmlns:p="http://schemas.openxmlformats.org/presentationml/2006/main">
-  <p:cSld>
-    <p:spTree>
-      <p:nvGrpSpPr>
-        <p:cNvPr id="1" name=""/>
-        <p:cNvGrpSpPr/>
-        <p:nvPr/>
-      </p:nvGrpSpPr>
-      <p:grpSpPr>
-        <a:xfrm>
-          <a:off x="0" y="0"/>
-          <a:ext cx="0" cy="0"/>
-          <a:chOff x="0" y="0"/>
-          <a:chExt cx="0" cy="0"/>
-        </a:xfrm>
-      </p:grpSpPr>
-      <p:sp>
-        <p:nvSpPr>
-          <p:cNvPr id="2" name="Title 1">
-            <a:extLst>
-              <a:ext uri="{FF2B5EF4-FFF2-40B4-BE49-F238E27FC236}">
-                <a16:creationId xmlns:a16="http://schemas.microsoft.com/office/drawing/2014/main" id="{BD1EE89B-96EF-98B1-D0B8-B1444BC797D3}"/>
-              </a:ext>
-            </a:extLst>
-          </p:cNvPr>
-          <p:cNvSpPr>
-            <a:spLocks noGrp="1"/>
-          </p:cNvSpPr>
-          <p:nvPr>
-            <p:ph type="title"/>
-          </p:nvPr>
-        </p:nvSpPr>
-        <p:spPr/>
-        <p:txBody>
-          <a:bodyPr/>
-          <a:lstStyle/>
-          <a:p>
-            <a:endParaRPr lang="en-US"/>
-          </a:p>
-        </p:txBody>
-      </p:sp>
-      <p:sp>
-        <p:nvSpPr>
-          <p:cNvPr id="3" name="Text Placeholder 2">
-            <a:extLst>
-              <a:ext uri="{FF2B5EF4-FFF2-40B4-BE49-F238E27FC236}">
-                <a16:creationId xmlns:a16="http://schemas.microsoft.com/office/drawing/2014/main" id="{E0EF95F7-64B9-D309-9220-E18C91247421}"/>
-              </a:ext>
-            </a:extLst>
-          </p:cNvPr>
-          <p:cNvSpPr>
-            <a:spLocks noGrp="1"/>
-          </p:cNvSpPr>
-          <p:nvPr>
-            <p:ph type="body" idx="1"/>
-          </p:nvPr>
-        </p:nvSpPr>
-        <p:spPr/>
-        <p:txBody>
-          <a:bodyPr/>
-          <a:lstStyle/>
-          <a:p>
-            <a:endParaRPr lang="en-US"/>
-          </a:p>
-        </p:txBody>
-      </p:sp>
-    </p:spTree>
-    <p:extLst>
-      <p:ext uri="{BB962C8B-B14F-4D97-AF65-F5344CB8AC3E}">
-        <p14:creationId xmlns:p14="http://schemas.microsoft.com/office/powerpoint/2010/main" val="2680926596"/>
-      </p:ext>
-    </p:extLst>
-  </p:cSld>
-  <p:clrMapOvr>
-    <a:masterClrMapping/>
-  </p:clrMapOvr>
-</p:sld>
-</file>
-
-<file path=ppt/slides/slide27.xml><?xml version="1.0" encoding="utf-8"?>
-<p:sld xmlns:a="http://schemas.openxmlformats.org/drawingml/2006/main" xmlns:r="http://schemas.openxmlformats.org/officeDocument/2006/relationships" xmlns:p="http://schemas.openxmlformats.org/presentationml/2006/main">
-  <p:cSld>
-    <p:spTree>
-      <p:nvGrpSpPr>
-        <p:cNvPr id="1" name=""/>
-        <p:cNvGrpSpPr/>
-        <p:nvPr/>
-      </p:nvGrpSpPr>
-      <p:grpSpPr>
-        <a:xfrm>
-          <a:off x="0" y="0"/>
-          <a:ext cx="0" cy="0"/>
-          <a:chOff x="0" y="0"/>
-          <a:chExt cx="0" cy="0"/>
-        </a:xfrm>
-      </p:grpSpPr>
-      <p:sp>
-        <p:nvSpPr>
-          <p:cNvPr id="2" name="Title 1">
-            <a:extLst>
-              <a:ext uri="{FF2B5EF4-FFF2-40B4-BE49-F238E27FC236}">
-                <a16:creationId xmlns:a16="http://schemas.microsoft.com/office/drawing/2014/main" id="{D0DB8342-2787-B605-0FCD-D2F5A2A90AA6}"/>
-              </a:ext>
-            </a:extLst>
-          </p:cNvPr>
-          <p:cNvSpPr>
-            <a:spLocks noGrp="1"/>
-          </p:cNvSpPr>
-          <p:nvPr>
-            <p:ph type="title"/>
-          </p:nvPr>
-        </p:nvSpPr>
-        <p:spPr/>
-        <p:txBody>
-          <a:bodyPr/>
-          <a:lstStyle/>
-          <a:p>
-            <a:endParaRPr lang="en-US"/>
-          </a:p>
-        </p:txBody>
-      </p:sp>
-      <p:sp>
-        <p:nvSpPr>
-          <p:cNvPr id="3" name="Text Placeholder 2">
-            <a:extLst>
-              <a:ext uri="{FF2B5EF4-FFF2-40B4-BE49-F238E27FC236}">
-                <a16:creationId xmlns:a16="http://schemas.microsoft.com/office/drawing/2014/main" id="{1DD55718-B502-4F90-70DE-D674E29B313F}"/>
-              </a:ext>
-            </a:extLst>
-          </p:cNvPr>
-          <p:cNvSpPr>
-            <a:spLocks noGrp="1"/>
-          </p:cNvSpPr>
-          <p:nvPr>
-            <p:ph type="body" sz="quarter" idx="13"/>
-          </p:nvPr>
-        </p:nvSpPr>
-        <p:spPr/>
-        <p:txBody>
-          <a:bodyPr/>
-          <a:lstStyle/>
-          <a:p>
-            <a:endParaRPr lang="en-US"/>
-          </a:p>
-        </p:txBody>
-      </p:sp>
-      <p:sp>
-        <p:nvSpPr>
-          <p:cNvPr id="4" name="Text Placeholder 3">
-            <a:extLst>
-              <a:ext uri="{FF2B5EF4-FFF2-40B4-BE49-F238E27FC236}">
-                <a16:creationId xmlns:a16="http://schemas.microsoft.com/office/drawing/2014/main" id="{BB0E5804-437C-22B6-207A-4D28B862C67B}"/>
-              </a:ext>
-            </a:extLst>
-          </p:cNvPr>
-          <p:cNvSpPr>
-            <a:spLocks noGrp="1"/>
-          </p:cNvSpPr>
-          <p:nvPr>
-            <p:ph type="body" idx="1"/>
-          </p:nvPr>
-        </p:nvSpPr>
-        <p:spPr/>
-        <p:txBody>
-          <a:bodyPr/>
-          <a:lstStyle/>
-          <a:p>
-            <a:endParaRPr lang="en-US"/>
-          </a:p>
-        </p:txBody>
-      </p:sp>
-    </p:spTree>
-    <p:extLst>
-      <p:ext uri="{BB962C8B-B14F-4D97-AF65-F5344CB8AC3E}">
-        <p14:creationId xmlns:p14="http://schemas.microsoft.com/office/powerpoint/2010/main" val="1640656948"/>
-      </p:ext>
-    </p:extLst>
-  </p:cSld>
-  <p:clrMapOvr>
-    <a:masterClrMapping/>
-  </p:clrMapOvr>
-</p:sld>
-</file>
-
-<file path=ppt/slides/slide28.xml><?xml version="1.0" encoding="utf-8"?>
-<p:sld xmlns:a="http://schemas.openxmlformats.org/drawingml/2006/main" xmlns:r="http://schemas.openxmlformats.org/officeDocument/2006/relationships" xmlns:p="http://schemas.openxmlformats.org/presentationml/2006/main">
-  <p:cSld>
-    <p:bg>
-      <p:bgPr>
-        <a:blipFill dpi="0" rotWithShape="1">
-          <a:blip r:embed="rId3">
-            <a:alphaModFix amt="69142"/>
-            <a:lum/>
-            <a:extLst>
-              <a:ext uri="{BEBA8EAE-BF5A-486C-A8C5-ECC9F3942E4B}">
-                <a14:imgProps xmlns:a14="http://schemas.microsoft.com/office/drawing/2010/main">
-                  <a14:imgLayer r:embed="rId4">
-                    <a14:imgEffect>
-                      <a14:artisticPastelsSmooth/>
-                    </a14:imgEffect>
-                  </a14:imgLayer>
-                </a14:imgProps>
-              </a:ext>
-            </a:extLst>
-          </a:blip>
-          <a:srcRect/>
-          <a:tile tx="0" ty="0" sx="100000" sy="100000" flip="none" algn="tl"/>
-        </a:blipFill>
-        <a:effectLst/>
-      </p:bgPr>
-    </p:bg>
-    <p:spTree>
-      <p:nvGrpSpPr>
-        <p:cNvPr id="1" name=""/>
-        <p:cNvGrpSpPr/>
-        <p:nvPr/>
-      </p:nvGrpSpPr>
-      <p:grpSpPr>
-        <a:xfrm>
-          <a:off x="0" y="0"/>
-          <a:ext cx="0" cy="0"/>
-          <a:chOff x="0" y="0"/>
-          <a:chExt cx="0" cy="0"/>
-        </a:xfrm>
-      </p:grpSpPr>
-      <p:sp>
-        <p:nvSpPr>
-          <p:cNvPr id="2" name="Title 1">
-            <a:extLst>
-              <a:ext uri="{FF2B5EF4-FFF2-40B4-BE49-F238E27FC236}">
-                <a16:creationId xmlns:a16="http://schemas.microsoft.com/office/drawing/2014/main" id="{C806E4C1-A41D-067E-F34B-92081CC326A2}"/>
-              </a:ext>
-            </a:extLst>
-          </p:cNvPr>
-          <p:cNvSpPr>
-            <a:spLocks noGrp="1"/>
-          </p:cNvSpPr>
-          <p:nvPr>
-            <p:ph type="title"/>
-          </p:nvPr>
-        </p:nvSpPr>
-        <p:spPr/>
-        <p:txBody>
-          <a:bodyPr/>
-          <a:lstStyle/>
-          <a:p>
-            <a:r>
-              <a:rPr lang="en-US" dirty="0"/>
-              <a:t>Section Header</a:t>
-            </a:r>
-          </a:p>
-        </p:txBody>
-      </p:sp>
-      <p:sp>
-        <p:nvSpPr>
-          <p:cNvPr id="3" name="Text Placeholder 2">
-            <a:extLst>
-              <a:ext uri="{FF2B5EF4-FFF2-40B4-BE49-F238E27FC236}">
-                <a16:creationId xmlns:a16="http://schemas.microsoft.com/office/drawing/2014/main" id="{35DE4B70-3814-7353-ED57-8DA4CECE5158}"/>
-              </a:ext>
-            </a:extLst>
-          </p:cNvPr>
-          <p:cNvSpPr>
-            <a:spLocks noGrp="1"/>
-          </p:cNvSpPr>
-          <p:nvPr>
-            <p:ph type="body" idx="1"/>
-          </p:nvPr>
-        </p:nvSpPr>
-        <p:spPr/>
-        <p:txBody>
-          <a:bodyPr/>
-          <a:lstStyle/>
-          <a:p>
-            <a:endParaRPr lang="en-US"/>
-          </a:p>
-        </p:txBody>
-      </p:sp>
-    </p:spTree>
-    <p:extLst>
-      <p:ext uri="{BB962C8B-B14F-4D97-AF65-F5344CB8AC3E}">
-        <p14:creationId xmlns:p14="http://schemas.microsoft.com/office/powerpoint/2010/main" val="332948493"/>
-      </p:ext>
-    </p:extLst>
-  </p:cSld>
-  <p:clrMapOvr>
-    <a:masterClrMapping/>
-  </p:clrMapOvr>
-</p:sld>
-</file>
-
-<file path=ppt/slides/slide29.xml><?xml version="1.0" encoding="utf-8"?>
-<p:sld xmlns:a="http://schemas.openxmlformats.org/drawingml/2006/main" xmlns:r="http://schemas.openxmlformats.org/officeDocument/2006/relationships" xmlns:p="http://schemas.openxmlformats.org/presentationml/2006/main">
-  <p:cSld>
-    <p:spTree>
-      <p:nvGrpSpPr>
-        <p:cNvPr id="1" name=""/>
-        <p:cNvGrpSpPr/>
-        <p:nvPr/>
-      </p:nvGrpSpPr>
-      <p:grpSpPr>
-        <a:xfrm>
-          <a:off x="0" y="0"/>
-          <a:ext cx="0" cy="0"/>
-          <a:chOff x="0" y="0"/>
-          <a:chExt cx="0" cy="0"/>
-        </a:xfrm>
-      </p:grpSpPr>
-      <p:sp>
-        <p:nvSpPr>
-          <p:cNvPr id="2" name="Title 1">
-            <a:extLst>
-              <a:ext uri="{FF2B5EF4-FFF2-40B4-BE49-F238E27FC236}">
-                <a16:creationId xmlns:a16="http://schemas.microsoft.com/office/drawing/2014/main" id="{CEF72732-434C-DE21-AFC5-A03B8B2BE1B7}"/>
-              </a:ext>
-            </a:extLst>
-          </p:cNvPr>
-          <p:cNvSpPr>
-            <a:spLocks noGrp="1"/>
-          </p:cNvSpPr>
-          <p:nvPr>
-            <p:ph type="title"/>
-          </p:nvPr>
-        </p:nvSpPr>
-        <p:spPr/>
-        <p:txBody>
-          <a:bodyPr/>
-          <a:lstStyle/>
-          <a:p>
-            <a:endParaRPr lang="en-US"/>
-          </a:p>
-        </p:txBody>
-      </p:sp>
-      <p:sp>
-        <p:nvSpPr>
-          <p:cNvPr id="3" name="Text Placeholder 2">
-            <a:extLst>
-              <a:ext uri="{FF2B5EF4-FFF2-40B4-BE49-F238E27FC236}">
-                <a16:creationId xmlns:a16="http://schemas.microsoft.com/office/drawing/2014/main" id="{1273B05D-3A61-A357-BAB9-ADEBA086D7DF}"/>
-              </a:ext>
-            </a:extLst>
-          </p:cNvPr>
-          <p:cNvSpPr>
-            <a:spLocks noGrp="1"/>
-          </p:cNvSpPr>
-          <p:nvPr>
-            <p:ph type="body" idx="1"/>
-          </p:nvPr>
-        </p:nvSpPr>
-        <p:spPr/>
-        <p:txBody>
-          <a:bodyPr/>
-          <a:lstStyle/>
-          <a:p>
-            <a:endParaRPr lang="en-US"/>
-          </a:p>
-        </p:txBody>
-      </p:sp>
-    </p:spTree>
-    <p:extLst>
-      <p:ext uri="{BB962C8B-B14F-4D97-AF65-F5344CB8AC3E}">
-        <p14:creationId xmlns:p14="http://schemas.microsoft.com/office/powerpoint/2010/main" val="878010779"/>
       </p:ext>
     </p:extLst>
   </p:cSld>
@@ -11205,111 +9130,6 @@
     <p:extLst>
       <p:ext uri="{BB962C8B-B14F-4D97-AF65-F5344CB8AC3E}">
         <p14:creationId xmlns:p14="http://schemas.microsoft.com/office/powerpoint/2010/main" val="1074506941"/>
-      </p:ext>
-    </p:extLst>
-  </p:cSld>
-  <p:clrMapOvr>
-    <a:masterClrMapping/>
-  </p:clrMapOvr>
-</p:sld>
-</file>
-
-<file path=ppt/slides/slide30.xml><?xml version="1.0" encoding="utf-8"?>
-<p:sld xmlns:a="http://schemas.openxmlformats.org/drawingml/2006/main" xmlns:r="http://schemas.openxmlformats.org/officeDocument/2006/relationships" xmlns:p="http://schemas.openxmlformats.org/presentationml/2006/main">
-  <p:cSld>
-    <p:spTree>
-      <p:nvGrpSpPr>
-        <p:cNvPr id="1" name=""/>
-        <p:cNvGrpSpPr/>
-        <p:nvPr/>
-      </p:nvGrpSpPr>
-      <p:grpSpPr>
-        <a:xfrm>
-          <a:off x="0" y="0"/>
-          <a:ext cx="0" cy="0"/>
-          <a:chOff x="0" y="0"/>
-          <a:chExt cx="0" cy="0"/>
-        </a:xfrm>
-      </p:grpSpPr>
-      <p:sp>
-        <p:nvSpPr>
-          <p:cNvPr id="2" name="Title 1">
-            <a:extLst>
-              <a:ext uri="{FF2B5EF4-FFF2-40B4-BE49-F238E27FC236}">
-                <a16:creationId xmlns:a16="http://schemas.microsoft.com/office/drawing/2014/main" id="{5E068B22-64B1-8BF1-9FE1-0224043CA689}"/>
-              </a:ext>
-            </a:extLst>
-          </p:cNvPr>
-          <p:cNvSpPr>
-            <a:spLocks noGrp="1"/>
-          </p:cNvSpPr>
-          <p:nvPr>
-            <p:ph type="title"/>
-          </p:nvPr>
-        </p:nvSpPr>
-        <p:spPr/>
-        <p:txBody>
-          <a:bodyPr/>
-          <a:lstStyle/>
-          <a:p>
-            <a:endParaRPr lang="en-US"/>
-          </a:p>
-        </p:txBody>
-      </p:sp>
-      <p:sp>
-        <p:nvSpPr>
-          <p:cNvPr id="3" name="Text Placeholder 2">
-            <a:extLst>
-              <a:ext uri="{FF2B5EF4-FFF2-40B4-BE49-F238E27FC236}">
-                <a16:creationId xmlns:a16="http://schemas.microsoft.com/office/drawing/2014/main" id="{F957F662-E215-E243-052F-D83259B613C9}"/>
-              </a:ext>
-            </a:extLst>
-          </p:cNvPr>
-          <p:cNvSpPr>
-            <a:spLocks noGrp="1"/>
-          </p:cNvSpPr>
-          <p:nvPr>
-            <p:ph type="body" sz="quarter" idx="13"/>
-          </p:nvPr>
-        </p:nvSpPr>
-        <p:spPr/>
-        <p:txBody>
-          <a:bodyPr/>
-          <a:lstStyle/>
-          <a:p>
-            <a:endParaRPr lang="en-US"/>
-          </a:p>
-        </p:txBody>
-      </p:sp>
-      <p:sp>
-        <p:nvSpPr>
-          <p:cNvPr id="4" name="Text Placeholder 3">
-            <a:extLst>
-              <a:ext uri="{FF2B5EF4-FFF2-40B4-BE49-F238E27FC236}">
-                <a16:creationId xmlns:a16="http://schemas.microsoft.com/office/drawing/2014/main" id="{2D20F5E5-ABD7-3141-098F-46962D266359}"/>
-              </a:ext>
-            </a:extLst>
-          </p:cNvPr>
-          <p:cNvSpPr>
-            <a:spLocks noGrp="1"/>
-          </p:cNvSpPr>
-          <p:nvPr>
-            <p:ph type="body" idx="1"/>
-          </p:nvPr>
-        </p:nvSpPr>
-        <p:spPr/>
-        <p:txBody>
-          <a:bodyPr/>
-          <a:lstStyle/>
-          <a:p>
-            <a:endParaRPr lang="en-US"/>
-          </a:p>
-        </p:txBody>
-      </p:sp>
-    </p:spTree>
-    <p:extLst>
-      <p:ext uri="{BB962C8B-B14F-4D97-AF65-F5344CB8AC3E}">
-        <p14:creationId xmlns:p14="http://schemas.microsoft.com/office/powerpoint/2010/main" val="2065770259"/>
       </p:ext>
     </p:extLst>
   </p:cSld>

</xml_diff>

<commit_message>
update include slide for whiteboard demo
</commit_message>
<xml_diff>
--- a/1-Monday/Intro-to-Git/WASTC2024-vFDW-Intro-to-Git.pptx
+++ b/1-Monday/Intro-to-Git/WASTC2024-vFDW-Intro-to-Git.pptx
@@ -5,10 +5,10 @@
     <p:sldMasterId id="2147483648" r:id="rId1"/>
   </p:sldMasterIdLst>
   <p:notesMasterIdLst>
-    <p:notesMasterId r:id="rId21"/>
+    <p:notesMasterId r:id="rId22"/>
   </p:notesMasterIdLst>
   <p:handoutMasterIdLst>
-    <p:handoutMasterId r:id="rId22"/>
+    <p:handoutMasterId r:id="rId23"/>
   </p:handoutMasterIdLst>
   <p:sldIdLst>
     <p:sldId id="256" r:id="rId2"/>
@@ -22,14 +22,15 @@
     <p:sldId id="282" r:id="rId10"/>
     <p:sldId id="257" r:id="rId11"/>
     <p:sldId id="284" r:id="rId12"/>
-    <p:sldId id="283" r:id="rId13"/>
-    <p:sldId id="262" r:id="rId14"/>
-    <p:sldId id="285" r:id="rId15"/>
-    <p:sldId id="271" r:id="rId16"/>
-    <p:sldId id="261" r:id="rId17"/>
-    <p:sldId id="286" r:id="rId18"/>
-    <p:sldId id="287" r:id="rId19"/>
-    <p:sldId id="270" r:id="rId20"/>
+    <p:sldId id="288" r:id="rId13"/>
+    <p:sldId id="283" r:id="rId14"/>
+    <p:sldId id="262" r:id="rId15"/>
+    <p:sldId id="285" r:id="rId16"/>
+    <p:sldId id="271" r:id="rId17"/>
+    <p:sldId id="261" r:id="rId18"/>
+    <p:sldId id="286" r:id="rId19"/>
+    <p:sldId id="287" r:id="rId20"/>
+    <p:sldId id="270" r:id="rId21"/>
   </p:sldIdLst>
   <p:sldSz cx="12192000" cy="6858000"/>
   <p:notesSz cx="6858000" cy="9144000"/>
@@ -826,7 +827,7 @@
           <a:p>
             <a:fld id="{A6590377-9AB7-BE4E-B5A4-7BC5E2C22E46}" type="slidenum">
               <a:rPr lang="en-US" smtClean="0"/>
-              <a:t>12</a:t>
+              <a:t>13</a:t>
             </a:fld>
             <a:endParaRPr lang="en-US"/>
           </a:p>
@@ -910,7 +911,7 @@
           <a:p>
             <a:fld id="{A6590377-9AB7-BE4E-B5A4-7BC5E2C22E46}" type="slidenum">
               <a:rPr lang="en-US" smtClean="0"/>
-              <a:t>15</a:t>
+              <a:t>16</a:t>
             </a:fld>
             <a:endParaRPr lang="en-US"/>
           </a:p>
@@ -994,7 +995,7 @@
           <a:p>
             <a:fld id="{A6590377-9AB7-BE4E-B5A4-7BC5E2C22E46}" type="slidenum">
               <a:rPr lang="en-US" smtClean="0"/>
-              <a:t>17</a:t>
+              <a:t>18</a:t>
             </a:fld>
             <a:endParaRPr lang="en-US"/>
           </a:p>
@@ -7151,6 +7152,94 @@
 <file path=ppt/slides/slide12.xml><?xml version="1.0" encoding="utf-8"?>
 <p:sld xmlns:a="http://schemas.openxmlformats.org/drawingml/2006/main" xmlns:r="http://schemas.openxmlformats.org/officeDocument/2006/relationships" xmlns:p="http://schemas.openxmlformats.org/presentationml/2006/main">
   <p:cSld>
+    <p:spTree>
+      <p:nvGrpSpPr>
+        <p:cNvPr id="1" name=""/>
+        <p:cNvGrpSpPr/>
+        <p:nvPr/>
+      </p:nvGrpSpPr>
+      <p:grpSpPr>
+        <a:xfrm>
+          <a:off x="0" y="0"/>
+          <a:ext cx="0" cy="0"/>
+          <a:chOff x="0" y="0"/>
+          <a:chExt cx="0" cy="0"/>
+        </a:xfrm>
+      </p:grpSpPr>
+      <p:sp>
+        <p:nvSpPr>
+          <p:cNvPr id="2" name="Title 1">
+            <a:extLst>
+              <a:ext uri="{FF2B5EF4-FFF2-40B4-BE49-F238E27FC236}">
+                <a16:creationId xmlns:a16="http://schemas.microsoft.com/office/drawing/2014/main" id="{7F72B42D-97A1-DD68-BB84-922809072E3D}"/>
+              </a:ext>
+            </a:extLst>
+          </p:cNvPr>
+          <p:cNvSpPr>
+            <a:spLocks noGrp="1"/>
+          </p:cNvSpPr>
+          <p:nvPr>
+            <p:ph type="title"/>
+          </p:nvPr>
+        </p:nvSpPr>
+        <p:spPr/>
+        <p:txBody>
+          <a:bodyPr/>
+          <a:lstStyle/>
+          <a:p>
+            <a:r>
+              <a:rPr lang="en-US" dirty="0"/>
+              <a:t>Git</a:t>
+            </a:r>
+          </a:p>
+        </p:txBody>
+      </p:sp>
+      <p:sp>
+        <p:nvSpPr>
+          <p:cNvPr id="3" name="Content Placeholder 2">
+            <a:extLst>
+              <a:ext uri="{FF2B5EF4-FFF2-40B4-BE49-F238E27FC236}">
+                <a16:creationId xmlns:a16="http://schemas.microsoft.com/office/drawing/2014/main" id="{A42E5E1F-3887-E842-4B67-E5C7715B8384}"/>
+              </a:ext>
+            </a:extLst>
+          </p:cNvPr>
+          <p:cNvSpPr>
+            <a:spLocks noGrp="1"/>
+          </p:cNvSpPr>
+          <p:nvPr>
+            <p:ph idx="1"/>
+          </p:nvPr>
+        </p:nvSpPr>
+        <p:spPr/>
+        <p:txBody>
+          <a:bodyPr>
+            <a:noAutofit/>
+          </a:bodyPr>
+          <a:lstStyle/>
+          <a:p>
+            <a:r>
+              <a:rPr lang="en-US" sz="2800" dirty="0"/>
+              <a:t>Switch to iPad screen – demo local/remote workflow</a:t>
+            </a:r>
+          </a:p>
+        </p:txBody>
+      </p:sp>
+    </p:spTree>
+    <p:extLst>
+      <p:ext uri="{BB962C8B-B14F-4D97-AF65-F5344CB8AC3E}">
+        <p14:creationId xmlns:p14="http://schemas.microsoft.com/office/powerpoint/2010/main" val="1747021195"/>
+      </p:ext>
+    </p:extLst>
+  </p:cSld>
+  <p:clrMapOvr>
+    <a:masterClrMapping/>
+  </p:clrMapOvr>
+</p:sld>
+</file>
+
+<file path=ppt/slides/slide13.xml><?xml version="1.0" encoding="utf-8"?>
+<p:sld xmlns:a="http://schemas.openxmlformats.org/drawingml/2006/main" xmlns:r="http://schemas.openxmlformats.org/officeDocument/2006/relationships" xmlns:p="http://schemas.openxmlformats.org/presentationml/2006/main">
+  <p:cSld>
     <p:bg>
       <p:bgPr>
         <a:blipFill dpi="0" rotWithShape="1">
@@ -7238,7 +7327,7 @@
 </p:sld>
 </file>
 
-<file path=ppt/slides/slide13.xml><?xml version="1.0" encoding="utf-8"?>
+<file path=ppt/slides/slide14.xml><?xml version="1.0" encoding="utf-8"?>
 <p:sld xmlns:a="http://schemas.openxmlformats.org/drawingml/2006/main" xmlns:r="http://schemas.openxmlformats.org/officeDocument/2006/relationships" xmlns:p="http://schemas.openxmlformats.org/presentationml/2006/main">
   <p:cSld>
     <p:spTree>
@@ -7533,7 +7622,7 @@
 </p:sld>
 </file>
 
-<file path=ppt/slides/slide14.xml><?xml version="1.0" encoding="utf-8"?>
+<file path=ppt/slides/slide15.xml><?xml version="1.0" encoding="utf-8"?>
 <p:sld xmlns:a="http://schemas.openxmlformats.org/drawingml/2006/main" xmlns:r="http://schemas.openxmlformats.org/officeDocument/2006/relationships" xmlns:p="http://schemas.openxmlformats.org/presentationml/2006/main">
   <p:cSld>
     <p:spTree>
@@ -7887,7 +7976,7 @@
 </p:sld>
 </file>
 
-<file path=ppt/slides/slide15.xml><?xml version="1.0" encoding="utf-8"?>
+<file path=ppt/slides/slide16.xml><?xml version="1.0" encoding="utf-8"?>
 <p:sld xmlns:a="http://schemas.openxmlformats.org/drawingml/2006/main" xmlns:r="http://schemas.openxmlformats.org/officeDocument/2006/relationships" xmlns:p="http://schemas.openxmlformats.org/presentationml/2006/main">
   <p:cSld>
     <p:bg>
@@ -7997,7 +8086,7 @@
 </p:sld>
 </file>
 
-<file path=ppt/slides/slide16.xml><?xml version="1.0" encoding="utf-8"?>
+<file path=ppt/slides/slide17.xml><?xml version="1.0" encoding="utf-8"?>
 <p:sld xmlns:a="http://schemas.openxmlformats.org/drawingml/2006/main" xmlns:r="http://schemas.openxmlformats.org/officeDocument/2006/relationships" xmlns:p="http://schemas.openxmlformats.org/presentationml/2006/main">
   <p:cSld>
     <p:spTree>
@@ -8114,7 +8203,7 @@
 </p:sld>
 </file>
 
-<file path=ppt/slides/slide17.xml><?xml version="1.0" encoding="utf-8"?>
+<file path=ppt/slides/slide18.xml><?xml version="1.0" encoding="utf-8"?>
 <p:sld xmlns:a="http://schemas.openxmlformats.org/drawingml/2006/main" xmlns:r="http://schemas.openxmlformats.org/officeDocument/2006/relationships" xmlns:p="http://schemas.openxmlformats.org/presentationml/2006/main">
   <p:cSld>
     <p:bg>
@@ -8196,7 +8285,7 @@
 </p:sld>
 </file>
 
-<file path=ppt/slides/slide18.xml><?xml version="1.0" encoding="utf-8"?>
+<file path=ppt/slides/slide19.xml><?xml version="1.0" encoding="utf-8"?>
 <p:sld xmlns:a="http://schemas.openxmlformats.org/drawingml/2006/main" xmlns:r="http://schemas.openxmlformats.org/officeDocument/2006/relationships" xmlns:p="http://schemas.openxmlformats.org/presentationml/2006/main">
   <p:cSld>
     <p:spTree>
@@ -8747,65 +8836,6 @@
     <p:extLst>
       <p:ext uri="{BB962C8B-B14F-4D97-AF65-F5344CB8AC3E}">
         <p14:creationId xmlns:p14="http://schemas.microsoft.com/office/powerpoint/2010/main" val="3357288541"/>
-      </p:ext>
-    </p:extLst>
-  </p:cSld>
-  <p:clrMapOvr>
-    <a:masterClrMapping/>
-  </p:clrMapOvr>
-</p:sld>
-</file>
-
-<file path=ppt/slides/slide19.xml><?xml version="1.0" encoding="utf-8"?>
-<p:sld xmlns:a="http://schemas.openxmlformats.org/drawingml/2006/main" xmlns:r="http://schemas.openxmlformats.org/officeDocument/2006/relationships" xmlns:p="http://schemas.openxmlformats.org/presentationml/2006/main">
-  <p:cSld>
-    <p:spTree>
-      <p:nvGrpSpPr>
-        <p:cNvPr id="1" name=""/>
-        <p:cNvGrpSpPr/>
-        <p:nvPr/>
-      </p:nvGrpSpPr>
-      <p:grpSpPr>
-        <a:xfrm>
-          <a:off x="0" y="0"/>
-          <a:ext cx="0" cy="0"/>
-          <a:chOff x="0" y="0"/>
-          <a:chExt cx="0" cy="0"/>
-        </a:xfrm>
-      </p:grpSpPr>
-      <p:sp>
-        <p:nvSpPr>
-          <p:cNvPr id="2" name="Title 1">
-            <a:extLst>
-              <a:ext uri="{FF2B5EF4-FFF2-40B4-BE49-F238E27FC236}">
-                <a16:creationId xmlns:a16="http://schemas.microsoft.com/office/drawing/2014/main" id="{FE44C711-A232-7ECB-672D-6F53FDDCA611}"/>
-              </a:ext>
-            </a:extLst>
-          </p:cNvPr>
-          <p:cNvSpPr>
-            <a:spLocks noGrp="1"/>
-          </p:cNvSpPr>
-          <p:nvPr>
-            <p:ph type="title"/>
-          </p:nvPr>
-        </p:nvSpPr>
-        <p:spPr/>
-        <p:txBody>
-          <a:bodyPr/>
-          <a:lstStyle/>
-          <a:p>
-            <a:pPr algn="ctr"/>
-            <a:r>
-              <a:rPr lang="en-US" dirty="0"/>
-              <a:t>Thank you</a:t>
-            </a:r>
-          </a:p>
-        </p:txBody>
-      </p:sp>
-    </p:spTree>
-    <p:extLst>
-      <p:ext uri="{BB962C8B-B14F-4D97-AF65-F5344CB8AC3E}">
-        <p14:creationId xmlns:p14="http://schemas.microsoft.com/office/powerpoint/2010/main" val="642994167"/>
       </p:ext>
     </p:extLst>
   </p:cSld>
@@ -8988,6 +9018,65 @@
     <p:extLst>
       <p:ext uri="{BB962C8B-B14F-4D97-AF65-F5344CB8AC3E}">
         <p14:creationId xmlns:p14="http://schemas.microsoft.com/office/powerpoint/2010/main" val="1638533772"/>
+      </p:ext>
+    </p:extLst>
+  </p:cSld>
+  <p:clrMapOvr>
+    <a:masterClrMapping/>
+  </p:clrMapOvr>
+</p:sld>
+</file>
+
+<file path=ppt/slides/slide20.xml><?xml version="1.0" encoding="utf-8"?>
+<p:sld xmlns:a="http://schemas.openxmlformats.org/drawingml/2006/main" xmlns:r="http://schemas.openxmlformats.org/officeDocument/2006/relationships" xmlns:p="http://schemas.openxmlformats.org/presentationml/2006/main">
+  <p:cSld>
+    <p:spTree>
+      <p:nvGrpSpPr>
+        <p:cNvPr id="1" name=""/>
+        <p:cNvGrpSpPr/>
+        <p:nvPr/>
+      </p:nvGrpSpPr>
+      <p:grpSpPr>
+        <a:xfrm>
+          <a:off x="0" y="0"/>
+          <a:ext cx="0" cy="0"/>
+          <a:chOff x="0" y="0"/>
+          <a:chExt cx="0" cy="0"/>
+        </a:xfrm>
+      </p:grpSpPr>
+      <p:sp>
+        <p:nvSpPr>
+          <p:cNvPr id="2" name="Title 1">
+            <a:extLst>
+              <a:ext uri="{FF2B5EF4-FFF2-40B4-BE49-F238E27FC236}">
+                <a16:creationId xmlns:a16="http://schemas.microsoft.com/office/drawing/2014/main" id="{FE44C711-A232-7ECB-672D-6F53FDDCA611}"/>
+              </a:ext>
+            </a:extLst>
+          </p:cNvPr>
+          <p:cNvSpPr>
+            <a:spLocks noGrp="1"/>
+          </p:cNvSpPr>
+          <p:nvPr>
+            <p:ph type="title"/>
+          </p:nvPr>
+        </p:nvSpPr>
+        <p:spPr/>
+        <p:txBody>
+          <a:bodyPr/>
+          <a:lstStyle/>
+          <a:p>
+            <a:pPr algn="ctr"/>
+            <a:r>
+              <a:rPr lang="en-US" dirty="0"/>
+              <a:t>Thank you</a:t>
+            </a:r>
+          </a:p>
+        </p:txBody>
+      </p:sp>
+    </p:spTree>
+    <p:extLst>
+      <p:ext uri="{BB962C8B-B14F-4D97-AF65-F5344CB8AC3E}">
+        <p14:creationId xmlns:p14="http://schemas.microsoft.com/office/powerpoint/2010/main" val="642994167"/>
       </p:ext>
     </p:extLst>
   </p:cSld>

</xml_diff>